<commit_message>
adds memory allocation maps from ti.openem.user.guide to thesis_method slides
</commit_message>
<xml_diff>
--- a/thesis_method.pptx
+++ b/thesis_method.pptx
@@ -5,7 +5,7 @@
     <p:sldMasterId id="2147483648" r:id="rId1"/>
   </p:sldMasterIdLst>
   <p:notesMasterIdLst>
-    <p:notesMasterId r:id="rId18"/>
+    <p:notesMasterId r:id="rId19"/>
   </p:notesMasterIdLst>
   <p:sldIdLst>
     <p:sldId id="256" r:id="rId2"/>
@@ -15,15 +15,16 @@
     <p:sldId id="257" r:id="rId6"/>
     <p:sldId id="262" r:id="rId7"/>
     <p:sldId id="269" r:id="rId8"/>
-    <p:sldId id="271" r:id="rId9"/>
-    <p:sldId id="263" r:id="rId10"/>
-    <p:sldId id="261" r:id="rId11"/>
-    <p:sldId id="264" r:id="rId12"/>
-    <p:sldId id="266" r:id="rId13"/>
-    <p:sldId id="267" r:id="rId14"/>
-    <p:sldId id="272" r:id="rId15"/>
-    <p:sldId id="265" r:id="rId16"/>
-    <p:sldId id="268" r:id="rId17"/>
+    <p:sldId id="273" r:id="rId9"/>
+    <p:sldId id="271" r:id="rId10"/>
+    <p:sldId id="263" r:id="rId11"/>
+    <p:sldId id="261" r:id="rId12"/>
+    <p:sldId id="264" r:id="rId13"/>
+    <p:sldId id="266" r:id="rId14"/>
+    <p:sldId id="267" r:id="rId15"/>
+    <p:sldId id="272" r:id="rId16"/>
+    <p:sldId id="265" r:id="rId17"/>
+    <p:sldId id="268" r:id="rId18"/>
   </p:sldIdLst>
   <p:sldSz cx="9144000" cy="6858000" type="screen4x3"/>
   <p:notesSz cx="6858000" cy="9144000"/>
@@ -134,6 +135,7 @@
             <p14:sldId id="257"/>
             <p14:sldId id="262"/>
             <p14:sldId id="269"/>
+            <p14:sldId id="273"/>
             <p14:sldId id="271"/>
             <p14:sldId id="263"/>
             <p14:sldId id="261"/>
@@ -853,6 +855,18 @@
           <a:p>
             <a:endParaRPr lang="en-US"/>
           </a:p>
+          <a:p>
+            <a:r>
+              <a:rPr lang="en-US"/>
+              <a:t>----- Meeting Notes (04/06/15 16:11) -----</a:t>
+            </a:r>
+          </a:p>
+          <a:p>
+            <a:r>
+              <a:rPr lang="en-US"/>
+              <a:t>scheduler specifics, koodivälimuisti, execution object specifics, core groups</a:t>
+            </a:r>
+          </a:p>
         </p:txBody>
       </p:sp>
       <p:sp>
@@ -956,7 +970,7 @@
           <a:p>
             <a:fld id="{C599660D-8B38-4C41-A6B7-D7EED9039F0B}" type="slidenum">
               <a:rPr lang="en-US" smtClean="0"/>
-              <a:t>10</a:t>
+              <a:t>11</a:t>
             </a:fld>
             <a:endParaRPr lang="en-US"/>
           </a:p>
@@ -1052,7 +1066,7 @@
           <a:p>
             <a:fld id="{C599660D-8B38-4C41-A6B7-D7EED9039F0B}" type="slidenum">
               <a:rPr lang="en-US" smtClean="0"/>
-              <a:t>11</a:t>
+              <a:t>12</a:t>
             </a:fld>
             <a:endParaRPr lang="en-US"/>
           </a:p>
@@ -4160,7 +4174,7 @@
       </p:grpSpPr>
       <p:sp>
         <p:nvSpPr>
-          <p:cNvPr id="2" name="Title 1"/>
+          <p:cNvPr id="6" name="Title 5"/>
           <p:cNvSpPr>
             <a:spLocks noGrp="1"/>
           </p:cNvSpPr>
@@ -4175,156 +4189,45 @@
           <a:p>
             <a:r>
               <a:rPr lang="en-US" dirty="0" smtClean="0"/>
-              <a:t>PREESM Generated Code for TI	</a:t>
+              <a:t>PREESM Actors</a:t>
             </a:r>
             <a:endParaRPr lang="en-US" dirty="0"/>
           </a:p>
         </p:txBody>
       </p:sp>
-      <p:sp>
-        <p:nvSpPr>
-          <p:cNvPr id="3" name="Content Placeholder 2"/>
-          <p:cNvSpPr>
-            <a:spLocks noGrp="1"/>
-          </p:cNvSpPr>
-          <p:nvPr>
-            <p:ph idx="1"/>
-          </p:nvPr>
-        </p:nvSpPr>
-        <p:spPr/>
-        <p:txBody>
-          <a:bodyPr>
-            <a:normAutofit fontScale="85000" lnSpcReduction="10000"/>
-          </a:bodyPr>
-          <a:lstStyle/>
-          <a:p>
-            <a:r>
-              <a:rPr lang="en-US" dirty="0" smtClean="0"/>
-              <a:t>PREESM is capable of generating code from the actor model program defined using graphical tools for C6678</a:t>
-            </a:r>
-          </a:p>
-          <a:p>
-            <a:pPr lvl="1"/>
-            <a:r>
-              <a:rPr lang="en-US" dirty="0" smtClean="0"/>
-              <a:t>Eclipse LUNA needed for graphical tools</a:t>
-            </a:r>
-          </a:p>
-          <a:p>
-            <a:r>
-              <a:rPr lang="en-US" dirty="0" smtClean="0"/>
-              <a:t>The generated code requires a custom target platform in CCS which alters the default memory layout</a:t>
-            </a:r>
-          </a:p>
-          <a:p>
-            <a:pPr lvl="1"/>
-            <a:r>
-              <a:rPr lang="en-US" dirty="0" smtClean="0"/>
-              <a:t>5.3 &gt; CCS Version &gt; 5.2 required</a:t>
-            </a:r>
-          </a:p>
-          <a:p>
-            <a:r>
-              <a:rPr lang="en-US" dirty="0" smtClean="0"/>
-              <a:t>Requires sys/bios and </a:t>
-            </a:r>
-            <a:r>
-              <a:rPr lang="en-US" dirty="0" err="1" smtClean="0"/>
-              <a:t>ipc</a:t>
-            </a:r>
-            <a:endParaRPr lang="en-US" dirty="0" smtClean="0"/>
-          </a:p>
-          <a:p>
-            <a:pPr lvl="1"/>
-            <a:r>
-              <a:rPr lang="en-US" dirty="0" smtClean="0"/>
-              <a:t>BIOS MCSDK 2.x</a:t>
-            </a:r>
-          </a:p>
-          <a:p>
-            <a:pPr lvl="1"/>
-            <a:r>
-              <a:rPr lang="en-US" dirty="0" smtClean="0"/>
-              <a:t>&lt;</a:t>
-            </a:r>
-            <a:r>
-              <a:rPr lang="en-US" dirty="0" err="1" smtClean="0"/>
-              <a:t>ti</a:t>
-            </a:r>
-            <a:r>
-              <a:rPr lang="en-US" dirty="0" smtClean="0"/>
-              <a:t>/</a:t>
-            </a:r>
-            <a:r>
-              <a:rPr lang="en-US" dirty="0" err="1" smtClean="0"/>
-              <a:t>ipc</a:t>
-            </a:r>
-            <a:r>
-              <a:rPr lang="en-US" dirty="0" smtClean="0"/>
-              <a:t>/</a:t>
-            </a:r>
-            <a:r>
-              <a:rPr lang="en-US" dirty="0" err="1" smtClean="0"/>
-              <a:t>Ipc.h</a:t>
-            </a:r>
-            <a:r>
-              <a:rPr lang="en-US" dirty="0" smtClean="0"/>
-              <a:t>&gt;</a:t>
-            </a:r>
-          </a:p>
-          <a:p>
-            <a:pPr lvl="1"/>
-            <a:r>
-              <a:rPr lang="en-US" dirty="0" smtClean="0"/>
-              <a:t>&lt;</a:t>
-            </a:r>
-            <a:r>
-              <a:rPr lang="en-US" dirty="0" err="1" smtClean="0"/>
-              <a:t>ti</a:t>
-            </a:r>
-            <a:r>
-              <a:rPr lang="en-US" dirty="0" smtClean="0"/>
-              <a:t>/</a:t>
-            </a:r>
-            <a:r>
-              <a:rPr lang="en-US" dirty="0" err="1" smtClean="0"/>
-              <a:t>sysbios</a:t>
-            </a:r>
-            <a:r>
-              <a:rPr lang="en-US" dirty="0" smtClean="0"/>
-              <a:t>/</a:t>
-            </a:r>
-            <a:r>
-              <a:rPr lang="en-US" dirty="0" err="1" smtClean="0"/>
-              <a:t>knl</a:t>
-            </a:r>
-            <a:r>
-              <a:rPr lang="en-US" dirty="0" smtClean="0"/>
-              <a:t>/</a:t>
-            </a:r>
-            <a:r>
-              <a:rPr lang="en-US" dirty="0" err="1" smtClean="0"/>
-              <a:t>Semaphore.h</a:t>
-            </a:r>
-            <a:r>
-              <a:rPr lang="en-US" dirty="0" smtClean="0"/>
-              <a:t>&gt;</a:t>
-            </a:r>
-          </a:p>
-          <a:p>
-            <a:pPr lvl="1"/>
-            <a:r>
-              <a:rPr lang="en-US" dirty="0" err="1" smtClean="0"/>
-              <a:t>etc</a:t>
-            </a:r>
-            <a:endParaRPr lang="en-US" dirty="0"/>
-          </a:p>
-        </p:txBody>
-      </p:sp>
+      <p:pic>
+        <p:nvPicPr>
+          <p:cNvPr id="2" name="Picture 1" descr="preesm_gauss.pdf"/>
+          <p:cNvPicPr>
+            <a:picLocks noChangeAspect="1"/>
+          </p:cNvPicPr>
+          <p:nvPr/>
+        </p:nvPicPr>
+        <p:blipFill rotWithShape="1">
+          <a:blip r:embed="rId2">
+            <a:extLst>
+              <a:ext uri="{28A0092B-C50C-407E-A947-70E740481C1C}">
+                <a14:useLocalDpi xmlns:a14="http://schemas.microsoft.com/office/drawing/2010/main" val="0"/>
+              </a:ext>
+            </a:extLst>
+          </a:blip>
+          <a:srcRect l="5597" t="12939" r="4077" b="51447"/>
+          <a:stretch/>
+        </p:blipFill>
+        <p:spPr>
+          <a:xfrm>
+            <a:off x="179094" y="1417638"/>
+            <a:ext cx="8791591" cy="4485838"/>
+          </a:xfrm>
+          <a:prstGeom prst="rect">
+            <a:avLst/>
+          </a:prstGeom>
+        </p:spPr>
+      </p:pic>
     </p:spTree>
     <p:extLst>
       <p:ext uri="{BB962C8B-B14F-4D97-AF65-F5344CB8AC3E}">
-        <p14:creationId xmlns:p14="http://schemas.microsoft.com/office/powerpoint/2010/main" val="1240314304"/>
+        <p14:creationId xmlns:p14="http://schemas.microsoft.com/office/powerpoint/2010/main" val="1127986866"/>
       </p:ext>
     </p:extLst>
   </p:cSld>
@@ -4375,7 +4278,7 @@
           <a:p>
             <a:r>
               <a:rPr lang="en-US" dirty="0" smtClean="0"/>
-              <a:t>Thesis experiment</a:t>
+              <a:t>PREESM Generated Code for TI	</a:t>
             </a:r>
             <a:endParaRPr lang="en-US" dirty="0"/>
           </a:p>
@@ -4394,52 +4297,137 @@
         <p:spPr/>
         <p:txBody>
           <a:bodyPr>
-            <a:normAutofit/>
+            <a:normAutofit fontScale="85000" lnSpcReduction="10000"/>
           </a:bodyPr>
           <a:lstStyle/>
           <a:p>
             <a:r>
               <a:rPr lang="en-US" dirty="0" smtClean="0"/>
-              <a:t>Video filtering application with PREESM</a:t>
-            </a:r>
-          </a:p>
-          <a:p>
-            <a:r>
-              <a:rPr lang="en-US" dirty="0" smtClean="0"/>
-              <a:t>Convert the PREESM application to </a:t>
+              <a:t>PREESM is capable of generating code from the actor model program defined using graphical tools for C6678</a:t>
+            </a:r>
+          </a:p>
+          <a:p>
+            <a:pPr lvl="1"/>
+            <a:r>
+              <a:rPr lang="en-US" dirty="0" smtClean="0"/>
+              <a:t>Eclipse LUNA needed for graphical tools</a:t>
+            </a:r>
+          </a:p>
+          <a:p>
+            <a:r>
+              <a:rPr lang="en-US" dirty="0" smtClean="0"/>
+              <a:t>The generated code requires a custom target platform in CCS which alters the default memory layout</a:t>
+            </a:r>
+          </a:p>
+          <a:p>
+            <a:pPr lvl="1"/>
+            <a:r>
+              <a:rPr lang="en-US" dirty="0" smtClean="0"/>
+              <a:t>5.3 &gt; CCS Version &gt; 5.2 required</a:t>
+            </a:r>
+          </a:p>
+          <a:p>
+            <a:r>
+              <a:rPr lang="en-US" dirty="0" smtClean="0"/>
+              <a:t>Requires sys/bios and </a:t>
             </a:r>
             <a:r>
               <a:rPr lang="en-US" dirty="0" err="1" smtClean="0"/>
-              <a:t>OpenEM</a:t>
+              <a:t>ipc</a:t>
             </a:r>
             <a:endParaRPr lang="en-US" dirty="0" smtClean="0"/>
           </a:p>
           <a:p>
-            <a:r>
-              <a:rPr lang="en-US" dirty="0" smtClean="0"/>
-              <a:t>Analyze both applications</a:t>
-            </a:r>
-          </a:p>
-          <a:p>
             <a:pPr lvl="1"/>
             <a:r>
               <a:rPr lang="en-US" dirty="0" smtClean="0"/>
-              <a:t>Static analysis</a:t>
+              <a:t>BIOS MCSDK 2.x</a:t>
             </a:r>
           </a:p>
           <a:p>
             <a:pPr lvl="1"/>
             <a:r>
               <a:rPr lang="en-US" dirty="0" smtClean="0"/>
-              <a:t>Dynamic analysis</a:t>
-            </a:r>
+              <a:t>&lt;</a:t>
+            </a:r>
+            <a:r>
+              <a:rPr lang="en-US" dirty="0" err="1" smtClean="0"/>
+              <a:t>ti</a:t>
+            </a:r>
+            <a:r>
+              <a:rPr lang="en-US" dirty="0" smtClean="0"/>
+              <a:t>/</a:t>
+            </a:r>
+            <a:r>
+              <a:rPr lang="en-US" dirty="0" err="1" smtClean="0"/>
+              <a:t>ipc</a:t>
+            </a:r>
+            <a:r>
+              <a:rPr lang="en-US" dirty="0" smtClean="0"/>
+              <a:t>/</a:t>
+            </a:r>
+            <a:r>
+              <a:rPr lang="en-US" dirty="0" err="1" smtClean="0"/>
+              <a:t>Ipc.h</a:t>
+            </a:r>
+            <a:r>
+              <a:rPr lang="en-US" dirty="0" smtClean="0"/>
+              <a:t>&gt;</a:t>
+            </a:r>
+          </a:p>
+          <a:p>
+            <a:pPr lvl="1"/>
+            <a:r>
+              <a:rPr lang="en-US" dirty="0" smtClean="0"/>
+              <a:t>&lt;</a:t>
+            </a:r>
+            <a:r>
+              <a:rPr lang="en-US" dirty="0" err="1" smtClean="0"/>
+              <a:t>ti</a:t>
+            </a:r>
+            <a:r>
+              <a:rPr lang="en-US" dirty="0" smtClean="0"/>
+              <a:t>/</a:t>
+            </a:r>
+            <a:r>
+              <a:rPr lang="en-US" dirty="0" err="1" smtClean="0"/>
+              <a:t>sysbios</a:t>
+            </a:r>
+            <a:r>
+              <a:rPr lang="en-US" dirty="0" smtClean="0"/>
+              <a:t>/</a:t>
+            </a:r>
+            <a:r>
+              <a:rPr lang="en-US" dirty="0" err="1" smtClean="0"/>
+              <a:t>knl</a:t>
+            </a:r>
+            <a:r>
+              <a:rPr lang="en-US" dirty="0" smtClean="0"/>
+              <a:t>/</a:t>
+            </a:r>
+            <a:r>
+              <a:rPr lang="en-US" dirty="0" err="1" smtClean="0"/>
+              <a:t>Semaphore.h</a:t>
+            </a:r>
+            <a:r>
+              <a:rPr lang="en-US" dirty="0" smtClean="0"/>
+              <a:t>&gt;</a:t>
+            </a:r>
+          </a:p>
+          <a:p>
+            <a:pPr lvl="1"/>
+            <a:r>
+              <a:rPr lang="en-US" dirty="0" err="1" smtClean="0"/>
+              <a:t>etc</a:t>
+            </a:r>
+            <a:endParaRPr lang="en-US" dirty="0"/>
           </a:p>
         </p:txBody>
       </p:sp>
     </p:spTree>
     <p:extLst>
       <p:ext uri="{BB962C8B-B14F-4D97-AF65-F5344CB8AC3E}">
-        <p14:creationId xmlns:p14="http://schemas.microsoft.com/office/powerpoint/2010/main" val="1052199147"/>
+        <p14:creationId xmlns:p14="http://schemas.microsoft.com/office/powerpoint/2010/main" val="1240314304"/>
       </p:ext>
     </p:extLst>
   </p:cSld>
@@ -4485,77 +4473,89 @@
         </p:nvSpPr>
         <p:spPr/>
         <p:txBody>
+          <a:bodyPr/>
+          <a:lstStyle/>
+          <a:p>
+            <a:r>
+              <a:rPr lang="en-US" dirty="0" smtClean="0"/>
+              <a:t>Thesis experiment</a:t>
+            </a:r>
+            <a:endParaRPr lang="en-US" dirty="0"/>
+          </a:p>
+        </p:txBody>
+      </p:sp>
+      <p:sp>
+        <p:nvSpPr>
+          <p:cNvPr id="3" name="Content Placeholder 2"/>
+          <p:cNvSpPr>
+            <a:spLocks noGrp="1"/>
+          </p:cNvSpPr>
+          <p:nvPr>
+            <p:ph idx="1"/>
+          </p:nvPr>
+        </p:nvSpPr>
+        <p:spPr/>
+        <p:txBody>
           <a:bodyPr>
-            <a:normAutofit fontScale="90000"/>
+            <a:normAutofit/>
           </a:bodyPr>
           <a:lstStyle/>
           <a:p>
             <a:r>
               <a:rPr lang="en-US" dirty="0" smtClean="0"/>
-              <a:t>Video Filter Application using PREESM</a:t>
-            </a:r>
-            <a:endParaRPr lang="en-US" dirty="0"/>
-          </a:p>
-        </p:txBody>
-      </p:sp>
-      <p:sp>
-        <p:nvSpPr>
-          <p:cNvPr id="3" name="Content Placeholder 2"/>
-          <p:cNvSpPr>
-            <a:spLocks noGrp="1"/>
-          </p:cNvSpPr>
-          <p:nvPr>
-            <p:ph idx="1"/>
-          </p:nvPr>
-        </p:nvSpPr>
-        <p:spPr/>
-        <p:txBody>
-          <a:bodyPr/>
-          <a:lstStyle/>
-          <a:p>
-            <a:r>
-              <a:rPr lang="en-US" dirty="0"/>
-              <a:t>Multiple input video streams</a:t>
-            </a:r>
-          </a:p>
-          <a:p>
-            <a:r>
-              <a:rPr lang="en-US" dirty="0" err="1"/>
-              <a:t>Sobel</a:t>
-            </a:r>
-            <a:r>
-              <a:rPr lang="en-US" dirty="0"/>
-              <a:t> &amp; Gaussian filters capable of processing the same stream on multiple cores</a:t>
-            </a:r>
-          </a:p>
-          <a:p>
-            <a:r>
-              <a:rPr lang="en-US" dirty="0"/>
-              <a:t>Manually scheduled</a:t>
+              <a:t>Video filtering application with PREESM</a:t>
+            </a:r>
+          </a:p>
+          <a:p>
+            <a:r>
+              <a:rPr lang="en-US" dirty="0" smtClean="0"/>
+              <a:t>Convert the PREESM application to </a:t>
+            </a:r>
+            <a:r>
+              <a:rPr lang="en-US" dirty="0" err="1" smtClean="0"/>
+              <a:t>OpenEM</a:t>
+            </a:r>
+            <a:endParaRPr lang="en-US" dirty="0" smtClean="0"/>
+          </a:p>
+          <a:p>
+            <a:r>
+              <a:rPr lang="en-US" dirty="0" smtClean="0"/>
+              <a:t>Analyze both applications</a:t>
             </a:r>
           </a:p>
           <a:p>
             <a:pPr lvl="1"/>
             <a:r>
-              <a:rPr lang="en-US" dirty="0"/>
-              <a:t>Actors divided between cores depending on the number of input streams</a:t>
-            </a:r>
-          </a:p>
-          <a:p>
-            <a:endParaRPr lang="en-US" dirty="0"/>
+              <a:rPr lang="en-US" dirty="0" smtClean="0"/>
+              <a:t>Static analysis</a:t>
+            </a:r>
+          </a:p>
+          <a:p>
+            <a:pPr lvl="1"/>
+            <a:r>
+              <a:rPr lang="en-US" dirty="0" smtClean="0"/>
+              <a:t>Dynamic analysis</a:t>
+            </a:r>
           </a:p>
         </p:txBody>
       </p:sp>
     </p:spTree>
     <p:extLst>
       <p:ext uri="{BB962C8B-B14F-4D97-AF65-F5344CB8AC3E}">
-        <p14:creationId xmlns:p14="http://schemas.microsoft.com/office/powerpoint/2010/main" val="2838267606"/>
+        <p14:creationId xmlns:p14="http://schemas.microsoft.com/office/powerpoint/2010/main" val="1052199147"/>
       </p:ext>
     </p:extLst>
   </p:cSld>
   <p:clrMapOvr>
     <a:masterClrMapping/>
   </p:clrMapOvr>
+  <p:timing>
+    <p:tnLst>
+      <p:par>
+        <p:cTn xmlns:p14="http://schemas.microsoft.com/office/powerpoint/2010/main" id="1" dur="indefinite" restart="never" nodeType="tmRoot"/>
+      </p:par>
+    </p:tnLst>
+  </p:timing>
 </p:sld>
 </file>
 
@@ -4588,16 +4588,14 @@
         </p:nvSpPr>
         <p:spPr/>
         <p:txBody>
-          <a:bodyPr/>
-          <a:lstStyle/>
-          <a:p>
-            <a:r>
-              <a:rPr lang="en-US" dirty="0" smtClean="0"/>
-              <a:t>Actors in </a:t>
-            </a:r>
-            <a:r>
-              <a:rPr lang="en-US" dirty="0" err="1" smtClean="0"/>
-              <a:t>OpenEM</a:t>
+          <a:bodyPr>
+            <a:normAutofit fontScale="90000"/>
+          </a:bodyPr>
+          <a:lstStyle/>
+          <a:p>
+            <a:r>
+              <a:rPr lang="en-US" dirty="0" smtClean="0"/>
+              <a:t>Video Filter Application using PREESM</a:t>
             </a:r>
             <a:endParaRPr lang="en-US" dirty="0"/>
           </a:p>
@@ -4619,37 +4617,55 @@
           <a:lstStyle/>
           <a:p>
             <a:r>
-              <a:rPr lang="en-US" dirty="0" smtClean="0"/>
-              <a:t>Map Actors to Execution Objects</a:t>
-            </a:r>
-          </a:p>
-          <a:p>
-            <a:r>
-              <a:rPr lang="en-US" dirty="0" smtClean="0"/>
-              <a:t>PREESM </a:t>
-            </a:r>
-            <a:r>
-              <a:rPr lang="en-US" dirty="0" smtClean="0"/>
-              <a:t>Actor model guarantees memory independency between Actors and the data is moved in static size </a:t>
-            </a:r>
-            <a:r>
-              <a:rPr lang="en-US" dirty="0" smtClean="0"/>
-              <a:t>units</a:t>
-            </a:r>
-            <a:endParaRPr lang="en-US" dirty="0" smtClean="0"/>
+              <a:rPr lang="en-US" dirty="0"/>
+              <a:t>Multiple input video streams</a:t>
+            </a:r>
+          </a:p>
+          <a:p>
+            <a:r>
+              <a:rPr lang="en-US" dirty="0" err="1"/>
+              <a:t>Sobel</a:t>
+            </a:r>
+            <a:r>
+              <a:rPr lang="en-US" dirty="0"/>
+              <a:t> &amp; Gaussian filters capable of processing the same stream on multiple cores</a:t>
+            </a:r>
+          </a:p>
+          <a:p>
+            <a:r>
+              <a:rPr lang="en-US" dirty="0"/>
+              <a:t>Manually scheduled</a:t>
+            </a:r>
+          </a:p>
+          <a:p>
+            <a:pPr lvl="1"/>
+            <a:r>
+              <a:rPr lang="en-US" dirty="0"/>
+              <a:t>Actors divided between cores depending on the number of input streams</a:t>
+            </a:r>
+          </a:p>
+          <a:p>
+            <a:endParaRPr lang="en-US" dirty="0"/>
           </a:p>
         </p:txBody>
       </p:sp>
     </p:spTree>
     <p:extLst>
       <p:ext uri="{BB962C8B-B14F-4D97-AF65-F5344CB8AC3E}">
-        <p14:creationId xmlns:p14="http://schemas.microsoft.com/office/powerpoint/2010/main" val="1538209171"/>
+        <p14:creationId xmlns:p14="http://schemas.microsoft.com/office/powerpoint/2010/main" val="2838267606"/>
       </p:ext>
     </p:extLst>
   </p:cSld>
   <p:clrMapOvr>
     <a:masterClrMapping/>
   </p:clrMapOvr>
+  <p:timing>
+    <p:tnLst>
+      <p:par>
+        <p:cTn xmlns:p14="http://schemas.microsoft.com/office/powerpoint/2010/main" id="1" dur="indefinite" restart="never" nodeType="tmRoot"/>
+      </p:par>
+    </p:tnLst>
+  </p:timing>
 </p:sld>
 </file>
 
@@ -4682,14 +4698,12 @@
         </p:nvSpPr>
         <p:spPr/>
         <p:txBody>
-          <a:bodyPr>
-            <a:normAutofit fontScale="90000"/>
-          </a:bodyPr>
-          <a:lstStyle/>
-          <a:p>
-            <a:r>
-              <a:rPr lang="en-US" dirty="0" smtClean="0"/>
-              <a:t>Implementing the experiment with </a:t>
+          <a:bodyPr/>
+          <a:lstStyle/>
+          <a:p>
+            <a:r>
+              <a:rPr lang="en-US" dirty="0" smtClean="0"/>
+              <a:t>Actors in </a:t>
             </a:r>
             <a:r>
               <a:rPr lang="en-US" dirty="0" err="1" smtClean="0"/>
@@ -4711,114 +4725,39 @@
         </p:nvSpPr>
         <p:spPr/>
         <p:txBody>
-          <a:bodyPr>
-            <a:normAutofit fontScale="85000" lnSpcReduction="20000"/>
-          </a:bodyPr>
-          <a:lstStyle/>
-          <a:p>
-            <a:r>
-              <a:rPr lang="en-US" dirty="0" smtClean="0"/>
-              <a:t>Input</a:t>
-            </a:r>
-          </a:p>
-          <a:p>
-            <a:pPr lvl="1"/>
-            <a:r>
-              <a:rPr lang="en-US" dirty="0" smtClean="0"/>
-              <a:t>Data preloaded in to memory</a:t>
-            </a:r>
-          </a:p>
-          <a:p>
-            <a:pPr lvl="1"/>
-            <a:r>
-              <a:rPr lang="en-US" dirty="0" smtClean="0"/>
-              <a:t>A regular for loop </a:t>
-            </a:r>
-            <a:r>
-              <a:rPr lang="en-US" dirty="0" err="1" smtClean="0"/>
-              <a:t>em_allocing</a:t>
-            </a:r>
-            <a:r>
-              <a:rPr lang="en-US" dirty="0" smtClean="0"/>
-              <a:t> events outside the </a:t>
-            </a:r>
-            <a:r>
-              <a:rPr lang="en-US" dirty="0" err="1" smtClean="0"/>
-              <a:t>OpenEM</a:t>
-            </a:r>
-            <a:r>
-              <a:rPr lang="en-US" dirty="0" smtClean="0"/>
-              <a:t> operating context</a:t>
-            </a:r>
-          </a:p>
-          <a:p>
-            <a:pPr lvl="1"/>
-            <a:r>
-              <a:rPr lang="en-US" dirty="0" smtClean="0"/>
-              <a:t>Low priority Queue for input events that </a:t>
-            </a:r>
-            <a:r>
-              <a:rPr lang="en-US" dirty="0" err="1" smtClean="0"/>
-              <a:t>em_alloc</a:t>
-            </a:r>
-            <a:r>
-              <a:rPr lang="en-US" dirty="0" smtClean="0"/>
-              <a:t> actual data events and new input events</a:t>
-            </a:r>
-          </a:p>
-          <a:p>
-            <a:r>
-              <a:rPr lang="en-US" dirty="0" smtClean="0"/>
-              <a:t>Output</a:t>
-            </a:r>
-          </a:p>
-          <a:p>
-            <a:pPr lvl="1"/>
-            <a:r>
-              <a:rPr lang="en-US" dirty="0" smtClean="0"/>
-              <a:t>Low priority queues which collect events holding the results that are allocated by the actual filter EO</a:t>
-            </a:r>
-          </a:p>
-          <a:p>
-            <a:pPr lvl="1"/>
-            <a:r>
-              <a:rPr lang="en-US" dirty="0" smtClean="0"/>
-              <a:t>Collect statistics and free events</a:t>
-            </a:r>
-          </a:p>
-          <a:p>
-            <a:r>
-              <a:rPr lang="en-US" dirty="0" smtClean="0"/>
-              <a:t>Processing</a:t>
-            </a:r>
-          </a:p>
-          <a:p>
-            <a:pPr lvl="1"/>
-            <a:r>
-              <a:rPr lang="en-US" dirty="0" smtClean="0"/>
-              <a:t>Filters implemented as Execution objects</a:t>
-            </a:r>
-          </a:p>
-          <a:p>
-            <a:pPr lvl="1"/>
-            <a:endParaRPr lang="en-US" dirty="0" smtClean="0"/>
-          </a:p>
-          <a:p>
-            <a:pPr lvl="1"/>
-            <a:endParaRPr lang="en-US" dirty="0" smtClean="0"/>
+          <a:bodyPr/>
+          <a:lstStyle/>
+          <a:p>
+            <a:r>
+              <a:rPr lang="en-US" dirty="0" smtClean="0"/>
+              <a:t>Map Actors to Execution Objects</a:t>
+            </a:r>
+          </a:p>
+          <a:p>
+            <a:r>
+              <a:rPr lang="en-US" dirty="0" smtClean="0"/>
+              <a:t>PREESM Actor model guarantees memory independency between Actors and the data is moved in static size units</a:t>
+            </a:r>
           </a:p>
         </p:txBody>
       </p:sp>
     </p:spTree>
     <p:extLst>
       <p:ext uri="{BB962C8B-B14F-4D97-AF65-F5344CB8AC3E}">
-        <p14:creationId xmlns:p14="http://schemas.microsoft.com/office/powerpoint/2010/main" val="3545089472"/>
+        <p14:creationId xmlns:p14="http://schemas.microsoft.com/office/powerpoint/2010/main" val="1538209171"/>
       </p:ext>
     </p:extLst>
   </p:cSld>
   <p:clrMapOvr>
     <a:masterClrMapping/>
   </p:clrMapOvr>
+  <p:timing>
+    <p:tnLst>
+      <p:par>
+        <p:cTn xmlns:p14="http://schemas.microsoft.com/office/powerpoint/2010/main" id="1" dur="indefinite" restart="never" nodeType="tmRoot"/>
+      </p:par>
+    </p:tnLst>
+  </p:timing>
 </p:sld>
 </file>
 
@@ -4851,12 +4790,18 @@
         </p:nvSpPr>
         <p:spPr/>
         <p:txBody>
-          <a:bodyPr/>
-          <a:lstStyle/>
-          <a:p>
-            <a:r>
-              <a:rPr lang="en-US" dirty="0" smtClean="0"/>
-              <a:t>I/O</a:t>
+          <a:bodyPr>
+            <a:normAutofit fontScale="90000"/>
+          </a:bodyPr>
+          <a:lstStyle/>
+          <a:p>
+            <a:r>
+              <a:rPr lang="en-US" dirty="0" smtClean="0"/>
+              <a:t>Implementing the experiment with </a:t>
+            </a:r>
+            <a:r>
+              <a:rPr lang="en-US" dirty="0" err="1" smtClean="0"/>
+              <a:t>OpenEM</a:t>
             </a:r>
             <a:endParaRPr lang="en-US" dirty="0"/>
           </a:p>
@@ -4875,77 +4820,120 @@
         <p:spPr/>
         <p:txBody>
           <a:bodyPr>
-            <a:normAutofit fontScale="92500" lnSpcReduction="10000"/>
+            <a:normAutofit fontScale="85000" lnSpcReduction="20000"/>
           </a:bodyPr>
           <a:lstStyle/>
           <a:p>
             <a:r>
               <a:rPr lang="en-US" dirty="0" smtClean="0"/>
-              <a:t>This thesis does not take the effect of I/O in to account</a:t>
-            </a:r>
-          </a:p>
-          <a:p>
-            <a:r>
-              <a:rPr lang="en-US" dirty="0" smtClean="0"/>
-              <a:t>The video streams are preloaded in to memory and there is no output stream</a:t>
-            </a:r>
-          </a:p>
-          <a:p>
-            <a:r>
-              <a:rPr lang="en-US" dirty="0" smtClean="0"/>
-              <a:t>The TMS320C6678 contains a switch fabric called </a:t>
+              <a:t>Input</a:t>
+            </a:r>
+          </a:p>
+          <a:p>
+            <a:pPr lvl="1"/>
+            <a:r>
+              <a:rPr lang="en-US" dirty="0" smtClean="0"/>
+              <a:t>Data preloaded in to memory</a:t>
+            </a:r>
+          </a:p>
+          <a:p>
+            <a:pPr lvl="1"/>
+            <a:r>
+              <a:rPr lang="en-US" dirty="0" smtClean="0"/>
+              <a:t>A regular for loop </a:t>
             </a:r>
             <a:r>
               <a:rPr lang="en-US" dirty="0" err="1" smtClean="0"/>
-              <a:t>TeraNet</a:t>
-            </a:r>
-            <a:r>
-              <a:rPr lang="en-US" dirty="0" smtClean="0"/>
-              <a:t> which connects the Multicore Shared Memory Controller with peripherals</a:t>
-            </a:r>
-          </a:p>
-          <a:p>
-            <a:r>
-              <a:rPr lang="en-US" dirty="0" smtClean="0"/>
-              <a:t>The </a:t>
+              <a:t>em_allocing</a:t>
+            </a:r>
+            <a:r>
+              <a:rPr lang="en-US" dirty="0" smtClean="0"/>
+              <a:t> events outside the </a:t>
             </a:r>
             <a:r>
               <a:rPr lang="en-US" dirty="0" err="1" smtClean="0"/>
-              <a:t>TeraNet</a:t>
-            </a:r>
-            <a:r>
-              <a:rPr lang="en-US" dirty="0" smtClean="0"/>
-              <a:t> is connected to </a:t>
+              <a:t>OpenEM</a:t>
+            </a:r>
+            <a:r>
+              <a:rPr lang="en-US" dirty="0" smtClean="0"/>
+              <a:t> operating context</a:t>
+            </a:r>
+          </a:p>
+          <a:p>
+            <a:pPr lvl="1"/>
+            <a:r>
+              <a:rPr lang="en-US" dirty="0" smtClean="0"/>
+              <a:t>Low priority Queue for input events that </a:t>
             </a:r>
             <a:r>
               <a:rPr lang="en-US" dirty="0" err="1" smtClean="0"/>
-              <a:t>ethernet</a:t>
-            </a:r>
-            <a:r>
-              <a:rPr lang="en-US" dirty="0" smtClean="0"/>
-              <a:t> and </a:t>
-            </a:r>
-            <a:r>
-              <a:rPr lang="en-US" dirty="0" err="1" smtClean="0"/>
-              <a:t>PCIe</a:t>
-            </a:r>
-            <a:r>
-              <a:rPr lang="en-US" dirty="0" smtClean="0"/>
-              <a:t> both of which could function as the external I/O interface</a:t>
-            </a:r>
+              <a:t>em_alloc</a:t>
+            </a:r>
+            <a:r>
+              <a:rPr lang="en-US" dirty="0" smtClean="0"/>
+              <a:t> actual data events and new input events</a:t>
+            </a:r>
+          </a:p>
+          <a:p>
+            <a:r>
+              <a:rPr lang="en-US" dirty="0" smtClean="0"/>
+              <a:t>Output</a:t>
+            </a:r>
+          </a:p>
+          <a:p>
+            <a:pPr lvl="1"/>
+            <a:r>
+              <a:rPr lang="en-US" dirty="0" smtClean="0"/>
+              <a:t>Low priority queues which collect events holding the results that are allocated by the actual filter EO</a:t>
+            </a:r>
+          </a:p>
+          <a:p>
+            <a:pPr lvl="1"/>
+            <a:r>
+              <a:rPr lang="en-US" dirty="0" smtClean="0"/>
+              <a:t>Collect statistics and free events</a:t>
+            </a:r>
+          </a:p>
+          <a:p>
+            <a:r>
+              <a:rPr lang="en-US" dirty="0" smtClean="0"/>
+              <a:t>Processing</a:t>
+            </a:r>
+          </a:p>
+          <a:p>
+            <a:pPr lvl="1"/>
+            <a:r>
+              <a:rPr lang="en-US" dirty="0" smtClean="0"/>
+              <a:t>Filters implemented as Execution objects</a:t>
+            </a:r>
+          </a:p>
+          <a:p>
+            <a:pPr lvl="1"/>
+            <a:endParaRPr lang="en-US" dirty="0" smtClean="0"/>
+          </a:p>
+          <a:p>
+            <a:pPr lvl="1"/>
+            <a:endParaRPr lang="en-US" dirty="0" smtClean="0"/>
           </a:p>
         </p:txBody>
       </p:sp>
     </p:spTree>
     <p:extLst>
       <p:ext uri="{BB962C8B-B14F-4D97-AF65-F5344CB8AC3E}">
-        <p14:creationId xmlns:p14="http://schemas.microsoft.com/office/powerpoint/2010/main" val="1275643183"/>
+        <p14:creationId xmlns:p14="http://schemas.microsoft.com/office/powerpoint/2010/main" val="3545089472"/>
       </p:ext>
     </p:extLst>
   </p:cSld>
   <p:clrMapOvr>
     <a:masterClrMapping/>
   </p:clrMapOvr>
+  <p:timing>
+    <p:tnLst>
+      <p:par>
+        <p:cTn xmlns:p14="http://schemas.microsoft.com/office/powerpoint/2010/main" id="1" dur="indefinite" restart="never" nodeType="tmRoot"/>
+      </p:par>
+    </p:tnLst>
+  </p:timing>
 </p:sld>
 </file>
 
@@ -4983,6 +4971,140 @@
           <a:p>
             <a:r>
               <a:rPr lang="en-US" dirty="0" smtClean="0"/>
+              <a:t>I/O</a:t>
+            </a:r>
+            <a:endParaRPr lang="en-US" dirty="0"/>
+          </a:p>
+        </p:txBody>
+      </p:sp>
+      <p:sp>
+        <p:nvSpPr>
+          <p:cNvPr id="3" name="Content Placeholder 2"/>
+          <p:cNvSpPr>
+            <a:spLocks noGrp="1"/>
+          </p:cNvSpPr>
+          <p:nvPr>
+            <p:ph idx="1"/>
+          </p:nvPr>
+        </p:nvSpPr>
+        <p:spPr/>
+        <p:txBody>
+          <a:bodyPr>
+            <a:normAutofit fontScale="92500" lnSpcReduction="10000"/>
+          </a:bodyPr>
+          <a:lstStyle/>
+          <a:p>
+            <a:r>
+              <a:rPr lang="en-US" dirty="0" smtClean="0"/>
+              <a:t>This thesis does not take the effect of I/O in to account</a:t>
+            </a:r>
+          </a:p>
+          <a:p>
+            <a:r>
+              <a:rPr lang="en-US" dirty="0" smtClean="0"/>
+              <a:t>The video streams are preloaded in to memory and there is no output stream</a:t>
+            </a:r>
+          </a:p>
+          <a:p>
+            <a:r>
+              <a:rPr lang="en-US" dirty="0" smtClean="0"/>
+              <a:t>The TMS320C6678 contains a switch fabric called </a:t>
+            </a:r>
+            <a:r>
+              <a:rPr lang="en-US" dirty="0" err="1" smtClean="0"/>
+              <a:t>TeraNet</a:t>
+            </a:r>
+            <a:r>
+              <a:rPr lang="en-US" dirty="0" smtClean="0"/>
+              <a:t> which connects the Multicore Shared Memory Controller with peripherals</a:t>
+            </a:r>
+          </a:p>
+          <a:p>
+            <a:r>
+              <a:rPr lang="en-US" dirty="0" smtClean="0"/>
+              <a:t>The </a:t>
+            </a:r>
+            <a:r>
+              <a:rPr lang="en-US" dirty="0" err="1" smtClean="0"/>
+              <a:t>TeraNet</a:t>
+            </a:r>
+            <a:r>
+              <a:rPr lang="en-US" dirty="0" smtClean="0"/>
+              <a:t> is connected to </a:t>
+            </a:r>
+            <a:r>
+              <a:rPr lang="en-US" dirty="0" err="1" smtClean="0"/>
+              <a:t>ethernet</a:t>
+            </a:r>
+            <a:r>
+              <a:rPr lang="en-US" dirty="0" smtClean="0"/>
+              <a:t> and </a:t>
+            </a:r>
+            <a:r>
+              <a:rPr lang="en-US" dirty="0" err="1" smtClean="0"/>
+              <a:t>PCIe</a:t>
+            </a:r>
+            <a:r>
+              <a:rPr lang="en-US" dirty="0" smtClean="0"/>
+              <a:t> both of which could function as the external I/O interface</a:t>
+            </a:r>
+          </a:p>
+        </p:txBody>
+      </p:sp>
+    </p:spTree>
+    <p:extLst>
+      <p:ext uri="{BB962C8B-B14F-4D97-AF65-F5344CB8AC3E}">
+        <p14:creationId xmlns:p14="http://schemas.microsoft.com/office/powerpoint/2010/main" val="1275643183"/>
+      </p:ext>
+    </p:extLst>
+  </p:cSld>
+  <p:clrMapOvr>
+    <a:masterClrMapping/>
+  </p:clrMapOvr>
+  <p:timing>
+    <p:tnLst>
+      <p:par>
+        <p:cTn xmlns:p14="http://schemas.microsoft.com/office/powerpoint/2010/main" id="1" dur="indefinite" restart="never" nodeType="tmRoot"/>
+      </p:par>
+    </p:tnLst>
+  </p:timing>
+</p:sld>
+</file>
+
+<file path=ppt/slides/slide17.xml><?xml version="1.0" encoding="utf-8"?>
+<p:sld xmlns:a="http://schemas.openxmlformats.org/drawingml/2006/main" xmlns:r="http://schemas.openxmlformats.org/officeDocument/2006/relationships" xmlns:p="http://schemas.openxmlformats.org/presentationml/2006/main">
+  <p:cSld>
+    <p:spTree>
+      <p:nvGrpSpPr>
+        <p:cNvPr id="1" name=""/>
+        <p:cNvGrpSpPr/>
+        <p:nvPr/>
+      </p:nvGrpSpPr>
+      <p:grpSpPr>
+        <a:xfrm>
+          <a:off x="0" y="0"/>
+          <a:ext cx="0" cy="0"/>
+          <a:chOff x="0" y="0"/>
+          <a:chExt cx="0" cy="0"/>
+        </a:xfrm>
+      </p:grpSpPr>
+      <p:sp>
+        <p:nvSpPr>
+          <p:cNvPr id="2" name="Title 1"/>
+          <p:cNvSpPr>
+            <a:spLocks noGrp="1"/>
+          </p:cNvSpPr>
+          <p:nvPr>
+            <p:ph type="title"/>
+          </p:nvPr>
+        </p:nvSpPr>
+        <p:spPr/>
+        <p:txBody>
+          <a:bodyPr/>
+          <a:lstStyle/>
+          <a:p>
+            <a:r>
+              <a:rPr lang="en-US" dirty="0" smtClean="0"/>
               <a:t>Analysis</a:t>
             </a:r>
             <a:endParaRPr lang="en-US" dirty="0"/>
@@ -5013,13 +5135,8 @@
             <a:pPr lvl="1"/>
             <a:r>
               <a:rPr lang="en-US" dirty="0" smtClean="0"/>
-              <a:t>Sketch a PSE </a:t>
-            </a:r>
-            <a:r>
-              <a:rPr lang="en-US" dirty="0" smtClean="0"/>
-              <a:t>model</a:t>
-            </a:r>
-            <a:endParaRPr lang="en-US" dirty="0" smtClean="0"/>
+              <a:t>Sketch a PSE model</a:t>
+            </a:r>
           </a:p>
           <a:p>
             <a:r>
@@ -5052,6 +5169,13 @@
   <p:clrMapOvr>
     <a:masterClrMapping/>
   </p:clrMapOvr>
+  <p:timing>
+    <p:tnLst>
+      <p:par>
+        <p:cTn xmlns:p14="http://schemas.microsoft.com/office/powerpoint/2010/main" id="1" dur="indefinite" restart="never" nodeType="tmRoot"/>
+      </p:par>
+    </p:tnLst>
+  </p:timing>
 </p:sld>
 </file>
 
@@ -5312,6 +5436,13 @@
   <p:clrMapOvr>
     <a:masterClrMapping/>
   </p:clrMapOvr>
+  <p:timing>
+    <p:tnLst>
+      <p:par>
+        <p:cTn xmlns:p14="http://schemas.microsoft.com/office/powerpoint/2010/main" id="1" dur="indefinite" restart="never" nodeType="tmRoot"/>
+      </p:par>
+    </p:tnLst>
+  </p:timing>
 </p:sld>
 </file>
 
@@ -5888,6 +6019,13 @@
   <p:clrMapOvr>
     <a:masterClrMapping/>
   </p:clrMapOvr>
+  <p:timing>
+    <p:tnLst>
+      <p:par>
+        <p:cTn xmlns:p14="http://schemas.microsoft.com/office/powerpoint/2010/main" id="1" dur="indefinite" restart="never" nodeType="tmRoot"/>
+      </p:par>
+    </p:tnLst>
+  </p:timing>
 </p:sld>
 </file>
 
@@ -5924,109 +6062,181 @@
           <a:lstStyle/>
           <a:p>
             <a:r>
+              <a:rPr lang="en-US" dirty="0" smtClean="0"/>
+              <a:t>Memory allocation</a:t>
+            </a:r>
+            <a:endParaRPr lang="en-US" dirty="0"/>
+          </a:p>
+        </p:txBody>
+      </p:sp>
+      <p:sp>
+        <p:nvSpPr>
+          <p:cNvPr id="3" name="Content Placeholder 2"/>
+          <p:cNvSpPr>
+            <a:spLocks noGrp="1"/>
+          </p:cNvSpPr>
+          <p:nvPr>
+            <p:ph idx="1"/>
+          </p:nvPr>
+        </p:nvSpPr>
+        <p:spPr/>
+        <p:txBody>
+          <a:bodyPr>
+            <a:normAutofit fontScale="77500" lnSpcReduction="20000"/>
+          </a:bodyPr>
+          <a:lstStyle/>
+          <a:p>
+            <a:r>
               <a:rPr lang="en-US" dirty="0"/>
-              <a:t>Dynamic event allocation</a:t>
-            </a:r>
-          </a:p>
-        </p:txBody>
-      </p:sp>
-      <p:sp>
-        <p:nvSpPr>
-          <p:cNvPr id="3" name="Content Placeholder 2"/>
-          <p:cNvSpPr>
-            <a:spLocks noGrp="1"/>
-          </p:cNvSpPr>
-          <p:nvPr>
-            <p:ph idx="1"/>
-          </p:nvPr>
-        </p:nvSpPr>
-        <p:spPr/>
-        <p:txBody>
-          <a:bodyPr/>
-          <a:lstStyle/>
-          <a:p>
-            <a:r>
-              <a:rPr lang="en-US" dirty="0" smtClean="0"/>
-              <a:t>Events </a:t>
+              <a:t>.</a:t>
+            </a:r>
+            <a:r>
+              <a:rPr lang="en-US" dirty="0" smtClean="0"/>
+              <a:t>tiEmSvPrivateEventDscMem1</a:t>
+            </a:r>
+          </a:p>
+          <a:p>
+            <a:pPr lvl="1"/>
+            <a:r>
+              <a:rPr lang="en-US" dirty="0" smtClean="0"/>
+              <a:t>memory</a:t>
             </a:r>
             <a:r>
               <a:rPr lang="en-US" dirty="0"/>
-              <a:t>can be allocated at </a:t>
-            </a:r>
-            <a:r>
-              <a:rPr lang="en-US" dirty="0" smtClean="0"/>
-              <a:t>runtime</a:t>
-            </a:r>
-          </a:p>
-          <a:p>
-            <a:r>
-              <a:rPr lang="en-US" dirty="0" smtClean="0"/>
-              <a:t>Events </a:t>
+              <a:t>: QMSS </a:t>
+            </a:r>
+            <a:r>
+              <a:rPr lang="en-US" dirty="0" smtClean="0"/>
+              <a:t>RAM</a:t>
+            </a:r>
+          </a:p>
+          <a:p>
+            <a:pPr lvl="1"/>
+            <a:r>
+              <a:rPr lang="en-US" dirty="0" smtClean="0"/>
+              <a:t>alignment</a:t>
             </a:r>
             <a:r>
               <a:rPr lang="en-US" dirty="0"/>
-              <a:t>can contain the data to be processed or just pointer to the shared memory location of the data buffer</a:t>
-            </a:r>
-          </a:p>
-          <a:p>
-            <a:pPr marL="800100" lvl="2" indent="0">
-              <a:buNone/>
-            </a:pPr>
-            <a:r>
-              <a:rPr lang="en-US" sz="2000" dirty="0"/>
-              <a:t>#pragma DATA_ALIGN   (</a:t>
-            </a:r>
-            <a:r>
-              <a:rPr lang="en-US" sz="2000" dirty="0" err="1"/>
-              <a:t>my_svJobDscTbl</a:t>
-            </a:r>
-            <a:r>
-              <a:rPr lang="en-US" sz="2000" dirty="0"/>
-              <a:t>, CACHE_L2_LINESIZE)</a:t>
-            </a:r>
-          </a:p>
-          <a:p>
-            <a:pPr marL="800100" lvl="2" indent="0">
-              <a:buNone/>
-            </a:pPr>
-            <a:r>
-              <a:rPr lang="en-US" sz="2000" dirty="0"/>
-              <a:t>#pragma DATA_SECTION (</a:t>
-            </a:r>
-            <a:r>
-              <a:rPr lang="en-US" sz="2000" dirty="0" err="1"/>
-              <a:t>my_svJobDscTbl</a:t>
-            </a:r>
-            <a:r>
-              <a:rPr lang="en-US" sz="2000" dirty="0"/>
-              <a:t>, ".my_svL1Mem");</a:t>
-            </a:r>
-          </a:p>
-          <a:p>
-            <a:pPr marL="800100" lvl="2" indent="0">
-              <a:buNone/>
-            </a:pPr>
-            <a:r>
-              <a:rPr lang="en-US" sz="2000" dirty="0" err="1"/>
-              <a:t>my_JobDsc</a:t>
-            </a:r>
-            <a:r>
-              <a:rPr lang="en-US" sz="2000" dirty="0"/>
+              <a:t>: </a:t>
+            </a:r>
+            <a:r>
+              <a:rPr lang="en-US" dirty="0" smtClean="0"/>
+              <a:t>CACHE_L2_LINESIZE</a:t>
+            </a:r>
+          </a:p>
+          <a:p>
+            <a:r>
+              <a:rPr lang="en-US" dirty="0" smtClean="0"/>
+              <a:t>.tiEmSvPrivateEventDscMem2 </a:t>
+            </a:r>
+            <a:endParaRPr lang="en-US" dirty="0"/>
+          </a:p>
+          <a:p>
+            <a:pPr lvl="1"/>
+            <a:r>
+              <a:rPr lang="en-US" dirty="0" smtClean="0"/>
+              <a:t>memory</a:t>
+            </a:r>
+            <a:r>
+              <a:rPr lang="en-US" dirty="0"/>
+              <a:t>: QMSS RAM </a:t>
+            </a:r>
+            <a:endParaRPr lang="en-US" dirty="0"/>
+          </a:p>
+          <a:p>
+            <a:pPr lvl="1"/>
+            <a:r>
+              <a:rPr lang="en-US" dirty="0" smtClean="0"/>
+              <a:t>alignment</a:t>
+            </a:r>
+            <a:r>
+              <a:rPr lang="en-US" dirty="0"/>
+              <a:t>: CACHE_L2_LINESIZE </a:t>
+            </a:r>
+            <a:endParaRPr lang="en-US" dirty="0"/>
+          </a:p>
+          <a:p>
+            <a:r>
+              <a:rPr lang="en-US" dirty="0" smtClean="0"/>
+              <a:t>.</a:t>
+            </a:r>
+            <a:r>
+              <a:rPr lang="en-US" dirty="0" err="1"/>
+              <a:t>tiEmSvPublicEventDscMem</a:t>
+            </a:r>
+            <a:r>
+              <a:rPr lang="en-US" dirty="0"/>
               <a:t> </a:t>
             </a:r>
-            <a:r>
-              <a:rPr lang="en-US" sz="2000" dirty="0" err="1"/>
-              <a:t>my_svJobDscTbl</a:t>
-            </a:r>
-            <a:r>
-              <a:rPr lang="en-US" sz="2000" dirty="0"/>
-              <a:t>[MY_JOB_NUM]</a:t>
-            </a:r>
-            <a:r>
-              <a:rPr lang="en-US" sz="2000" dirty="0" smtClean="0"/>
-              <a:t>;</a:t>
-            </a:r>
-            <a:endParaRPr lang="en-US" sz="2000" dirty="0"/>
+            <a:endParaRPr lang="en-US" dirty="0"/>
+          </a:p>
+          <a:p>
+            <a:pPr lvl="1"/>
+            <a:r>
+              <a:rPr lang="en-US" dirty="0" smtClean="0"/>
+              <a:t>memory</a:t>
+            </a:r>
+            <a:r>
+              <a:rPr lang="en-US" dirty="0"/>
+              <a:t>: MSMC RAM / DDR3 </a:t>
+            </a:r>
+            <a:endParaRPr lang="en-US" dirty="0"/>
+          </a:p>
+          <a:p>
+            <a:pPr lvl="1"/>
+            <a:r>
+              <a:rPr lang="en-US" dirty="0" smtClean="0"/>
+              <a:t>alignment</a:t>
+            </a:r>
+            <a:r>
+              <a:rPr lang="en-US" dirty="0"/>
+              <a:t>: CACHE_L2_LINESIZE </a:t>
+            </a:r>
+            <a:endParaRPr lang="en-US" dirty="0"/>
+          </a:p>
+          <a:p>
+            <a:r>
+              <a:rPr lang="en-US" dirty="0" smtClean="0"/>
+              <a:t>.</a:t>
+            </a:r>
+            <a:r>
+              <a:rPr lang="en-US" dirty="0" err="1"/>
+              <a:t>tiEmGvLocalEventDscMem</a:t>
+            </a:r>
+            <a:r>
+              <a:rPr lang="en-US" dirty="0"/>
+              <a:t> </a:t>
+            </a:r>
+            <a:endParaRPr lang="en-US" dirty="0"/>
+          </a:p>
+          <a:p>
+            <a:pPr lvl="1"/>
+            <a:r>
+              <a:rPr lang="en-US" dirty="0" smtClean="0"/>
+              <a:t>memory</a:t>
+            </a:r>
+            <a:r>
+              <a:rPr lang="en-US" dirty="0"/>
+              <a:t>: </a:t>
+            </a:r>
+            <a:r>
+              <a:rPr lang="en-US" dirty="0" smtClean="0"/>
+              <a:t>L2SRAM</a:t>
+            </a:r>
+            <a:endParaRPr lang="en-US" dirty="0"/>
+          </a:p>
+          <a:p>
+            <a:pPr lvl="1"/>
+            <a:r>
+              <a:rPr lang="en-US" dirty="0" smtClean="0"/>
+              <a:t>alignment</a:t>
+            </a:r>
+            <a:r>
+              <a:rPr lang="en-US" dirty="0"/>
+              <a:t>: CACHE_L2_LINESIZE </a:t>
+            </a:r>
+            <a:endParaRPr lang="en-US" dirty="0"/>
           </a:p>
           <a:p>
             <a:endParaRPr lang="en-US" dirty="0"/>
@@ -6036,7 +6246,7 @@
     </p:spTree>
     <p:extLst>
       <p:ext uri="{BB962C8B-B14F-4D97-AF65-F5344CB8AC3E}">
-        <p14:creationId xmlns:p14="http://schemas.microsoft.com/office/powerpoint/2010/main" val="252091811"/>
+        <p14:creationId xmlns:p14="http://schemas.microsoft.com/office/powerpoint/2010/main" val="2887038273"/>
       </p:ext>
     </p:extLst>
   </p:cSld>
@@ -6065,7 +6275,7 @@
       </p:grpSpPr>
       <p:sp>
         <p:nvSpPr>
-          <p:cNvPr id="6" name="Title 5"/>
+          <p:cNvPr id="2" name="Title 1"/>
           <p:cNvSpPr>
             <a:spLocks noGrp="1"/>
           </p:cNvSpPr>
@@ -6079,46 +6289,61 @@
           <a:lstStyle/>
           <a:p>
             <a:r>
-              <a:rPr lang="en-US" dirty="0" smtClean="0"/>
-              <a:t>PREESM Actors</a:t>
+              <a:rPr lang="en-US" dirty="0"/>
+              <a:t>Dynamic event allocation</a:t>
+            </a:r>
+          </a:p>
+        </p:txBody>
+      </p:sp>
+      <p:sp>
+        <p:nvSpPr>
+          <p:cNvPr id="3" name="Content Placeholder 2"/>
+          <p:cNvSpPr>
+            <a:spLocks noGrp="1"/>
+          </p:cNvSpPr>
+          <p:nvPr>
+            <p:ph idx="1"/>
+          </p:nvPr>
+        </p:nvSpPr>
+        <p:spPr/>
+        <p:txBody>
+          <a:bodyPr/>
+          <a:lstStyle/>
+          <a:p>
+            <a:r>
+              <a:rPr lang="en-US" dirty="0" smtClean="0"/>
+              <a:t>Events </a:t>
+            </a:r>
+            <a:r>
+              <a:rPr lang="en-US" dirty="0"/>
+              <a:t>can be allocated at </a:t>
+            </a:r>
+            <a:r>
+              <a:rPr lang="en-US" dirty="0" smtClean="0"/>
+              <a:t>runtime</a:t>
+            </a:r>
+          </a:p>
+          <a:p>
+            <a:r>
+              <a:rPr lang="en-US" dirty="0" smtClean="0"/>
+              <a:t>Events </a:t>
+            </a:r>
+            <a:r>
+              <a:rPr lang="en-US" dirty="0"/>
+              <a:t>can contain the data to be processed or just pointer to the shared memory location of the data </a:t>
+            </a:r>
+            <a:r>
+              <a:rPr lang="en-US" dirty="0" smtClean="0"/>
+              <a:t>buffer</a:t>
             </a:r>
             <a:endParaRPr lang="en-US" dirty="0"/>
           </a:p>
         </p:txBody>
       </p:sp>
-      <p:pic>
-        <p:nvPicPr>
-          <p:cNvPr id="2" name="Picture 1" descr="preesm_gauss.pdf"/>
-          <p:cNvPicPr>
-            <a:picLocks noChangeAspect="1"/>
-          </p:cNvPicPr>
-          <p:nvPr/>
-        </p:nvPicPr>
-        <p:blipFill rotWithShape="1">
-          <a:blip r:embed="rId2">
-            <a:extLst>
-              <a:ext uri="{28A0092B-C50C-407E-A947-70E740481C1C}">
-                <a14:useLocalDpi xmlns:a14="http://schemas.microsoft.com/office/drawing/2010/main" val="0"/>
-              </a:ext>
-            </a:extLst>
-          </a:blip>
-          <a:srcRect l="5597" t="12939" r="4077" b="51447"/>
-          <a:stretch/>
-        </p:blipFill>
-        <p:spPr>
-          <a:xfrm>
-            <a:off x="179094" y="1417638"/>
-            <a:ext cx="8791591" cy="4485838"/>
-          </a:xfrm>
-          <a:prstGeom prst="rect">
-            <a:avLst/>
-          </a:prstGeom>
-        </p:spPr>
-      </p:pic>
     </p:spTree>
     <p:extLst>
       <p:ext uri="{BB962C8B-B14F-4D97-AF65-F5344CB8AC3E}">
-        <p14:creationId xmlns:p14="http://schemas.microsoft.com/office/powerpoint/2010/main" val="1127986866"/>
+        <p14:creationId xmlns:p14="http://schemas.microsoft.com/office/powerpoint/2010/main" val="252091811"/>
       </p:ext>
     </p:extLst>
   </p:cSld>

</xml_diff>

<commit_message>
queue groups, improved description of memory sections
</commit_message>
<xml_diff>
--- a/thesis_method.pptx
+++ b/thesis_method.pptx
@@ -5,7 +5,7 @@
     <p:sldMasterId id="2147483648" r:id="rId1"/>
   </p:sldMasterIdLst>
   <p:notesMasterIdLst>
-    <p:notesMasterId r:id="rId19"/>
+    <p:notesMasterId r:id="rId23"/>
   </p:notesMasterIdLst>
   <p:sldIdLst>
     <p:sldId id="256" r:id="rId2"/>
@@ -15,16 +15,20 @@
     <p:sldId id="257" r:id="rId6"/>
     <p:sldId id="262" r:id="rId7"/>
     <p:sldId id="269" r:id="rId8"/>
-    <p:sldId id="273" r:id="rId9"/>
-    <p:sldId id="271" r:id="rId10"/>
-    <p:sldId id="263" r:id="rId11"/>
-    <p:sldId id="261" r:id="rId12"/>
-    <p:sldId id="264" r:id="rId13"/>
-    <p:sldId id="266" r:id="rId14"/>
-    <p:sldId id="267" r:id="rId15"/>
-    <p:sldId id="272" r:id="rId16"/>
-    <p:sldId id="265" r:id="rId17"/>
-    <p:sldId id="268" r:id="rId18"/>
+    <p:sldId id="274" r:id="rId9"/>
+    <p:sldId id="273" r:id="rId10"/>
+    <p:sldId id="271" r:id="rId11"/>
+    <p:sldId id="275" r:id="rId12"/>
+    <p:sldId id="276" r:id="rId13"/>
+    <p:sldId id="277" r:id="rId14"/>
+    <p:sldId id="263" r:id="rId15"/>
+    <p:sldId id="261" r:id="rId16"/>
+    <p:sldId id="264" r:id="rId17"/>
+    <p:sldId id="266" r:id="rId18"/>
+    <p:sldId id="267" r:id="rId19"/>
+    <p:sldId id="272" r:id="rId20"/>
+    <p:sldId id="265" r:id="rId21"/>
+    <p:sldId id="268" r:id="rId22"/>
   </p:sldIdLst>
   <p:sldSz cx="9144000" cy="6858000" type="screen4x3"/>
   <p:notesSz cx="6858000" cy="9144000"/>
@@ -135,8 +139,12 @@
             <p14:sldId id="257"/>
             <p14:sldId id="262"/>
             <p14:sldId id="269"/>
+            <p14:sldId id="274"/>
             <p14:sldId id="273"/>
             <p14:sldId id="271"/>
+            <p14:sldId id="275"/>
+            <p14:sldId id="276"/>
+            <p14:sldId id="277"/>
             <p14:sldId id="263"/>
             <p14:sldId id="261"/>
             <p14:sldId id="264"/>
@@ -970,7 +978,7 @@
           <a:p>
             <a:fld id="{C599660D-8B38-4C41-A6B7-D7EED9039F0B}" type="slidenum">
               <a:rPr lang="en-US" smtClean="0"/>
-              <a:t>11</a:t>
+              <a:t>15</a:t>
             </a:fld>
             <a:endParaRPr lang="en-US"/>
           </a:p>
@@ -1066,7 +1074,7 @@
           <a:p>
             <a:fld id="{C599660D-8B38-4C41-A6B7-D7EED9039F0B}" type="slidenum">
               <a:rPr lang="en-US" smtClean="0"/>
-              <a:t>12</a:t>
+              <a:t>16</a:t>
             </a:fld>
             <a:endParaRPr lang="en-US"/>
           </a:p>
@@ -4174,6 +4182,396 @@
       </p:grpSpPr>
       <p:sp>
         <p:nvSpPr>
+          <p:cNvPr id="2" name="Title 1"/>
+          <p:cNvSpPr>
+            <a:spLocks noGrp="1"/>
+          </p:cNvSpPr>
+          <p:nvPr>
+            <p:ph type="title"/>
+          </p:nvPr>
+        </p:nvSpPr>
+        <p:spPr/>
+        <p:txBody>
+          <a:bodyPr/>
+          <a:lstStyle/>
+          <a:p>
+            <a:r>
+              <a:rPr lang="en-US" dirty="0"/>
+              <a:t>Dynamic event allocation</a:t>
+            </a:r>
+          </a:p>
+        </p:txBody>
+      </p:sp>
+      <p:sp>
+        <p:nvSpPr>
+          <p:cNvPr id="3" name="Content Placeholder 2"/>
+          <p:cNvSpPr>
+            <a:spLocks noGrp="1"/>
+          </p:cNvSpPr>
+          <p:nvPr>
+            <p:ph idx="1"/>
+          </p:nvPr>
+        </p:nvSpPr>
+        <p:spPr/>
+        <p:txBody>
+          <a:bodyPr/>
+          <a:lstStyle/>
+          <a:p>
+            <a:r>
+              <a:rPr lang="en-US" dirty="0" smtClean="0"/>
+              <a:t>Events </a:t>
+            </a:r>
+            <a:r>
+              <a:rPr lang="en-US" dirty="0"/>
+              <a:t>can be allocated at </a:t>
+            </a:r>
+            <a:r>
+              <a:rPr lang="en-US" dirty="0" smtClean="0"/>
+              <a:t>runtime</a:t>
+            </a:r>
+          </a:p>
+          <a:p>
+            <a:r>
+              <a:rPr lang="en-US" dirty="0" smtClean="0"/>
+              <a:t>Events </a:t>
+            </a:r>
+            <a:r>
+              <a:rPr lang="en-US" dirty="0"/>
+              <a:t>can contain the data to be processed or just pointer to the shared memory location of the data </a:t>
+            </a:r>
+            <a:r>
+              <a:rPr lang="en-US" dirty="0" smtClean="0"/>
+              <a:t>buffer</a:t>
+            </a:r>
+            <a:endParaRPr lang="en-US" dirty="0"/>
+          </a:p>
+        </p:txBody>
+      </p:sp>
+    </p:spTree>
+    <p:extLst>
+      <p:ext uri="{BB962C8B-B14F-4D97-AF65-F5344CB8AC3E}">
+        <p14:creationId xmlns:p14="http://schemas.microsoft.com/office/powerpoint/2010/main" val="252091811"/>
+      </p:ext>
+    </p:extLst>
+  </p:cSld>
+  <p:clrMapOvr>
+    <a:masterClrMapping/>
+  </p:clrMapOvr>
+  <p:timing>
+    <p:tnLst>
+      <p:par>
+        <p:cTn xmlns:p14="http://schemas.microsoft.com/office/powerpoint/2010/main" id="1" dur="indefinite" restart="never" nodeType="tmRoot"/>
+      </p:par>
+    </p:tnLst>
+  </p:timing>
+</p:sld>
+</file>
+
+<file path=ppt/slides/slide11.xml><?xml version="1.0" encoding="utf-8"?>
+<p:sld xmlns:a="http://schemas.openxmlformats.org/drawingml/2006/main" xmlns:r="http://schemas.openxmlformats.org/officeDocument/2006/relationships" xmlns:p="http://schemas.openxmlformats.org/presentationml/2006/main">
+  <p:cSld>
+    <p:spTree>
+      <p:nvGrpSpPr>
+        <p:cNvPr id="1" name=""/>
+        <p:cNvGrpSpPr/>
+        <p:nvPr/>
+      </p:nvGrpSpPr>
+      <p:grpSpPr>
+        <a:xfrm>
+          <a:off x="0" y="0"/>
+          <a:ext cx="0" cy="0"/>
+          <a:chOff x="0" y="0"/>
+          <a:chExt cx="0" cy="0"/>
+        </a:xfrm>
+      </p:grpSpPr>
+      <p:sp>
+        <p:nvSpPr>
+          <p:cNvPr id="2" name="Title 1"/>
+          <p:cNvSpPr>
+            <a:spLocks noGrp="1"/>
+          </p:cNvSpPr>
+          <p:nvPr>
+            <p:ph type="title"/>
+          </p:nvPr>
+        </p:nvSpPr>
+        <p:spPr/>
+        <p:txBody>
+          <a:bodyPr/>
+          <a:lstStyle/>
+          <a:p>
+            <a:r>
+              <a:rPr lang="en-US" dirty="0" smtClean="0"/>
+              <a:t>Execution Objects</a:t>
+            </a:r>
+            <a:endParaRPr lang="en-US" dirty="0"/>
+          </a:p>
+        </p:txBody>
+      </p:sp>
+      <p:sp>
+        <p:nvSpPr>
+          <p:cNvPr id="3" name="Content Placeholder 2"/>
+          <p:cNvSpPr>
+            <a:spLocks noGrp="1"/>
+          </p:cNvSpPr>
+          <p:nvPr>
+            <p:ph idx="1"/>
+          </p:nvPr>
+        </p:nvSpPr>
+        <p:spPr/>
+        <p:txBody>
+          <a:bodyPr/>
+          <a:lstStyle/>
+          <a:p>
+            <a:r>
+              <a:rPr lang="en-US" dirty="0" smtClean="0"/>
+              <a:t>Execution objects can be created any time during execution but they cannot be deleted at runtime</a:t>
+            </a:r>
+          </a:p>
+          <a:p>
+            <a:r>
+              <a:rPr lang="en-US" dirty="0" smtClean="0"/>
+              <a:t>Created using </a:t>
+            </a:r>
+            <a:r>
+              <a:rPr lang="en-US" dirty="0" err="1" smtClean="0"/>
+              <a:t>em_eo_create</a:t>
+            </a:r>
+            <a:r>
+              <a:rPr lang="en-US" dirty="0" smtClean="0"/>
+              <a:t>()</a:t>
+            </a:r>
+            <a:endParaRPr lang="en-US" dirty="0"/>
+          </a:p>
+        </p:txBody>
+      </p:sp>
+    </p:spTree>
+    <p:extLst>
+      <p:ext uri="{BB962C8B-B14F-4D97-AF65-F5344CB8AC3E}">
+        <p14:creationId xmlns:p14="http://schemas.microsoft.com/office/powerpoint/2010/main" val="3048832305"/>
+      </p:ext>
+    </p:extLst>
+  </p:cSld>
+  <p:clrMapOvr>
+    <a:masterClrMapping/>
+  </p:clrMapOvr>
+</p:sld>
+</file>
+
+<file path=ppt/slides/slide12.xml><?xml version="1.0" encoding="utf-8"?>
+<p:sld xmlns:a="http://schemas.openxmlformats.org/drawingml/2006/main" xmlns:r="http://schemas.openxmlformats.org/officeDocument/2006/relationships" xmlns:p="http://schemas.openxmlformats.org/presentationml/2006/main">
+  <p:cSld>
+    <p:spTree>
+      <p:nvGrpSpPr>
+        <p:cNvPr id="1" name=""/>
+        <p:cNvGrpSpPr/>
+        <p:nvPr/>
+      </p:nvGrpSpPr>
+      <p:grpSpPr>
+        <a:xfrm>
+          <a:off x="0" y="0"/>
+          <a:ext cx="0" cy="0"/>
+          <a:chOff x="0" y="0"/>
+          <a:chExt cx="0" cy="0"/>
+        </a:xfrm>
+      </p:grpSpPr>
+      <p:sp>
+        <p:nvSpPr>
+          <p:cNvPr id="2" name="Title 1"/>
+          <p:cNvSpPr>
+            <a:spLocks noGrp="1"/>
+          </p:cNvSpPr>
+          <p:nvPr>
+            <p:ph type="title"/>
+          </p:nvPr>
+        </p:nvSpPr>
+        <p:spPr/>
+        <p:txBody>
+          <a:bodyPr/>
+          <a:lstStyle/>
+          <a:p>
+            <a:r>
+              <a:rPr lang="en-US" dirty="0" smtClean="0"/>
+              <a:t>Event Queues</a:t>
+            </a:r>
+            <a:endParaRPr lang="en-US" dirty="0"/>
+          </a:p>
+        </p:txBody>
+      </p:sp>
+      <p:sp>
+        <p:nvSpPr>
+          <p:cNvPr id="3" name="Content Placeholder 2"/>
+          <p:cNvSpPr>
+            <a:spLocks noGrp="1"/>
+          </p:cNvSpPr>
+          <p:nvPr>
+            <p:ph idx="1"/>
+          </p:nvPr>
+        </p:nvSpPr>
+        <p:spPr/>
+        <p:txBody>
+          <a:bodyPr/>
+          <a:lstStyle/>
+          <a:p>
+            <a:r>
+              <a:rPr lang="en-US" dirty="0" err="1" smtClean="0"/>
+              <a:t>Eqs</a:t>
+            </a:r>
+            <a:r>
+              <a:rPr lang="en-US" dirty="0" smtClean="0"/>
+              <a:t> created by the application are virtual queues, not QMSS HW queues</a:t>
+            </a:r>
+          </a:p>
+          <a:p>
+            <a:pPr lvl="1"/>
+            <a:r>
+              <a:rPr lang="en-US" dirty="0" smtClean="0"/>
+              <a:t>Application can create thousands of queues</a:t>
+            </a:r>
+          </a:p>
+          <a:p>
+            <a:pPr lvl="1"/>
+            <a:r>
+              <a:rPr lang="en-US" dirty="0" smtClean="0"/>
+              <a:t>EQs are mapped to HW queues according to their priorities and core masks</a:t>
+            </a:r>
+          </a:p>
+          <a:p>
+            <a:endParaRPr lang="en-US" dirty="0" smtClean="0"/>
+          </a:p>
+        </p:txBody>
+      </p:sp>
+    </p:spTree>
+    <p:extLst>
+      <p:ext uri="{BB962C8B-B14F-4D97-AF65-F5344CB8AC3E}">
+        <p14:creationId xmlns:p14="http://schemas.microsoft.com/office/powerpoint/2010/main" val="777957597"/>
+      </p:ext>
+    </p:extLst>
+  </p:cSld>
+  <p:clrMapOvr>
+    <a:masterClrMapping/>
+  </p:clrMapOvr>
+</p:sld>
+</file>
+
+<file path=ppt/slides/slide13.xml><?xml version="1.0" encoding="utf-8"?>
+<p:sld xmlns:a="http://schemas.openxmlformats.org/drawingml/2006/main" xmlns:r="http://schemas.openxmlformats.org/officeDocument/2006/relationships" xmlns:p="http://schemas.openxmlformats.org/presentationml/2006/main">
+  <p:cSld>
+    <p:spTree>
+      <p:nvGrpSpPr>
+        <p:cNvPr id="1" name=""/>
+        <p:cNvGrpSpPr/>
+        <p:nvPr/>
+      </p:nvGrpSpPr>
+      <p:grpSpPr>
+        <a:xfrm>
+          <a:off x="0" y="0"/>
+          <a:ext cx="0" cy="0"/>
+          <a:chOff x="0" y="0"/>
+          <a:chExt cx="0" cy="0"/>
+        </a:xfrm>
+      </p:grpSpPr>
+      <p:sp>
+        <p:nvSpPr>
+          <p:cNvPr id="2" name="Title 1"/>
+          <p:cNvSpPr>
+            <a:spLocks noGrp="1"/>
+          </p:cNvSpPr>
+          <p:nvPr>
+            <p:ph type="title"/>
+          </p:nvPr>
+        </p:nvSpPr>
+        <p:spPr/>
+        <p:txBody>
+          <a:bodyPr/>
+          <a:lstStyle/>
+          <a:p>
+            <a:r>
+              <a:rPr lang="en-US" dirty="0" smtClean="0"/>
+              <a:t>Queue Groups</a:t>
+            </a:r>
+            <a:endParaRPr lang="en-US" dirty="0"/>
+          </a:p>
+        </p:txBody>
+      </p:sp>
+      <p:sp>
+        <p:nvSpPr>
+          <p:cNvPr id="3" name="Content Placeholder 2"/>
+          <p:cNvSpPr>
+            <a:spLocks noGrp="1"/>
+          </p:cNvSpPr>
+          <p:nvPr>
+            <p:ph idx="1"/>
+          </p:nvPr>
+        </p:nvSpPr>
+        <p:spPr/>
+        <p:txBody>
+          <a:bodyPr/>
+          <a:lstStyle/>
+          <a:p>
+            <a:r>
+              <a:rPr lang="en-US" dirty="0" smtClean="0"/>
+              <a:t>An EQ belongs to a queue group</a:t>
+            </a:r>
+          </a:p>
+          <a:p>
+            <a:r>
+              <a:rPr lang="en-US" dirty="0" smtClean="0"/>
+              <a:t>Core masks are attached to queue groups</a:t>
+            </a:r>
+          </a:p>
+          <a:p>
+            <a:pPr lvl="1"/>
+            <a:r>
+              <a:rPr lang="en-US" dirty="0" smtClean="0"/>
+              <a:t>Allows selecting which cores will be getting events from specific EQ</a:t>
+            </a:r>
+          </a:p>
+          <a:p>
+            <a:r>
+              <a:rPr lang="en-US" dirty="0" smtClean="0"/>
+              <a:t>Dynamically created</a:t>
+            </a:r>
+          </a:p>
+          <a:p>
+            <a:r>
+              <a:rPr lang="en-US" dirty="0" smtClean="0"/>
+              <a:t>Defaults to all cores</a:t>
+            </a:r>
+          </a:p>
+        </p:txBody>
+      </p:sp>
+    </p:spTree>
+    <p:extLst>
+      <p:ext uri="{BB962C8B-B14F-4D97-AF65-F5344CB8AC3E}">
+        <p14:creationId xmlns:p14="http://schemas.microsoft.com/office/powerpoint/2010/main" val="4034827247"/>
+      </p:ext>
+    </p:extLst>
+  </p:cSld>
+  <p:clrMapOvr>
+    <a:masterClrMapping/>
+  </p:clrMapOvr>
+</p:sld>
+</file>
+
+<file path=ppt/slides/slide14.xml><?xml version="1.0" encoding="utf-8"?>
+<p:sld xmlns:a="http://schemas.openxmlformats.org/drawingml/2006/main" xmlns:r="http://schemas.openxmlformats.org/officeDocument/2006/relationships" xmlns:p="http://schemas.openxmlformats.org/presentationml/2006/main">
+  <p:cSld>
+    <p:spTree>
+      <p:nvGrpSpPr>
+        <p:cNvPr id="1" name=""/>
+        <p:cNvGrpSpPr/>
+        <p:nvPr/>
+      </p:nvGrpSpPr>
+      <p:grpSpPr>
+        <a:xfrm>
+          <a:off x="0" y="0"/>
+          <a:ext cx="0" cy="0"/>
+          <a:chOff x="0" y="0"/>
+          <a:chExt cx="0" cy="0"/>
+        </a:xfrm>
+      </p:grpSpPr>
+      <p:sp>
+        <p:nvSpPr>
           <p:cNvPr id="6" name="Title 5"/>
           <p:cNvSpPr>
             <a:spLocks noGrp="1"/>
@@ -4244,523 +4642,6 @@
 </p:sld>
 </file>
 
-<file path=ppt/slides/slide11.xml><?xml version="1.0" encoding="utf-8"?>
-<p:sld xmlns:a="http://schemas.openxmlformats.org/drawingml/2006/main" xmlns:r="http://schemas.openxmlformats.org/officeDocument/2006/relationships" xmlns:p="http://schemas.openxmlformats.org/presentationml/2006/main">
-  <p:cSld>
-    <p:spTree>
-      <p:nvGrpSpPr>
-        <p:cNvPr id="1" name=""/>
-        <p:cNvGrpSpPr/>
-        <p:nvPr/>
-      </p:nvGrpSpPr>
-      <p:grpSpPr>
-        <a:xfrm>
-          <a:off x="0" y="0"/>
-          <a:ext cx="0" cy="0"/>
-          <a:chOff x="0" y="0"/>
-          <a:chExt cx="0" cy="0"/>
-        </a:xfrm>
-      </p:grpSpPr>
-      <p:sp>
-        <p:nvSpPr>
-          <p:cNvPr id="2" name="Title 1"/>
-          <p:cNvSpPr>
-            <a:spLocks noGrp="1"/>
-          </p:cNvSpPr>
-          <p:nvPr>
-            <p:ph type="title"/>
-          </p:nvPr>
-        </p:nvSpPr>
-        <p:spPr/>
-        <p:txBody>
-          <a:bodyPr/>
-          <a:lstStyle/>
-          <a:p>
-            <a:r>
-              <a:rPr lang="en-US" dirty="0" smtClean="0"/>
-              <a:t>PREESM Generated Code for TI	</a:t>
-            </a:r>
-            <a:endParaRPr lang="en-US" dirty="0"/>
-          </a:p>
-        </p:txBody>
-      </p:sp>
-      <p:sp>
-        <p:nvSpPr>
-          <p:cNvPr id="3" name="Content Placeholder 2"/>
-          <p:cNvSpPr>
-            <a:spLocks noGrp="1"/>
-          </p:cNvSpPr>
-          <p:nvPr>
-            <p:ph idx="1"/>
-          </p:nvPr>
-        </p:nvSpPr>
-        <p:spPr/>
-        <p:txBody>
-          <a:bodyPr>
-            <a:normAutofit fontScale="85000" lnSpcReduction="10000"/>
-          </a:bodyPr>
-          <a:lstStyle/>
-          <a:p>
-            <a:r>
-              <a:rPr lang="en-US" dirty="0" smtClean="0"/>
-              <a:t>PREESM is capable of generating code from the actor model program defined using graphical tools for C6678</a:t>
-            </a:r>
-          </a:p>
-          <a:p>
-            <a:pPr lvl="1"/>
-            <a:r>
-              <a:rPr lang="en-US" dirty="0" smtClean="0"/>
-              <a:t>Eclipse LUNA needed for graphical tools</a:t>
-            </a:r>
-          </a:p>
-          <a:p>
-            <a:r>
-              <a:rPr lang="en-US" dirty="0" smtClean="0"/>
-              <a:t>The generated code requires a custom target platform in CCS which alters the default memory layout</a:t>
-            </a:r>
-          </a:p>
-          <a:p>
-            <a:pPr lvl="1"/>
-            <a:r>
-              <a:rPr lang="en-US" dirty="0" smtClean="0"/>
-              <a:t>5.3 &gt; CCS Version &gt; 5.2 required</a:t>
-            </a:r>
-          </a:p>
-          <a:p>
-            <a:r>
-              <a:rPr lang="en-US" dirty="0" smtClean="0"/>
-              <a:t>Requires sys/bios and </a:t>
-            </a:r>
-            <a:r>
-              <a:rPr lang="en-US" dirty="0" err="1" smtClean="0"/>
-              <a:t>ipc</a:t>
-            </a:r>
-            <a:endParaRPr lang="en-US" dirty="0" smtClean="0"/>
-          </a:p>
-          <a:p>
-            <a:pPr lvl="1"/>
-            <a:r>
-              <a:rPr lang="en-US" dirty="0" smtClean="0"/>
-              <a:t>BIOS MCSDK 2.x</a:t>
-            </a:r>
-          </a:p>
-          <a:p>
-            <a:pPr lvl="1"/>
-            <a:r>
-              <a:rPr lang="en-US" dirty="0" smtClean="0"/>
-              <a:t>&lt;</a:t>
-            </a:r>
-            <a:r>
-              <a:rPr lang="en-US" dirty="0" err="1" smtClean="0"/>
-              <a:t>ti</a:t>
-            </a:r>
-            <a:r>
-              <a:rPr lang="en-US" dirty="0" smtClean="0"/>
-              <a:t>/</a:t>
-            </a:r>
-            <a:r>
-              <a:rPr lang="en-US" dirty="0" err="1" smtClean="0"/>
-              <a:t>ipc</a:t>
-            </a:r>
-            <a:r>
-              <a:rPr lang="en-US" dirty="0" smtClean="0"/>
-              <a:t>/</a:t>
-            </a:r>
-            <a:r>
-              <a:rPr lang="en-US" dirty="0" err="1" smtClean="0"/>
-              <a:t>Ipc.h</a:t>
-            </a:r>
-            <a:r>
-              <a:rPr lang="en-US" dirty="0" smtClean="0"/>
-              <a:t>&gt;</a:t>
-            </a:r>
-          </a:p>
-          <a:p>
-            <a:pPr lvl="1"/>
-            <a:r>
-              <a:rPr lang="en-US" dirty="0" smtClean="0"/>
-              <a:t>&lt;</a:t>
-            </a:r>
-            <a:r>
-              <a:rPr lang="en-US" dirty="0" err="1" smtClean="0"/>
-              <a:t>ti</a:t>
-            </a:r>
-            <a:r>
-              <a:rPr lang="en-US" dirty="0" smtClean="0"/>
-              <a:t>/</a:t>
-            </a:r>
-            <a:r>
-              <a:rPr lang="en-US" dirty="0" err="1" smtClean="0"/>
-              <a:t>sysbios</a:t>
-            </a:r>
-            <a:r>
-              <a:rPr lang="en-US" dirty="0" smtClean="0"/>
-              <a:t>/</a:t>
-            </a:r>
-            <a:r>
-              <a:rPr lang="en-US" dirty="0" err="1" smtClean="0"/>
-              <a:t>knl</a:t>
-            </a:r>
-            <a:r>
-              <a:rPr lang="en-US" dirty="0" smtClean="0"/>
-              <a:t>/</a:t>
-            </a:r>
-            <a:r>
-              <a:rPr lang="en-US" dirty="0" err="1" smtClean="0"/>
-              <a:t>Semaphore.h</a:t>
-            </a:r>
-            <a:r>
-              <a:rPr lang="en-US" dirty="0" smtClean="0"/>
-              <a:t>&gt;</a:t>
-            </a:r>
-          </a:p>
-          <a:p>
-            <a:pPr lvl="1"/>
-            <a:r>
-              <a:rPr lang="en-US" dirty="0" err="1" smtClean="0"/>
-              <a:t>etc</a:t>
-            </a:r>
-            <a:endParaRPr lang="en-US" dirty="0"/>
-          </a:p>
-        </p:txBody>
-      </p:sp>
-    </p:spTree>
-    <p:extLst>
-      <p:ext uri="{BB962C8B-B14F-4D97-AF65-F5344CB8AC3E}">
-        <p14:creationId xmlns:p14="http://schemas.microsoft.com/office/powerpoint/2010/main" val="1240314304"/>
-      </p:ext>
-    </p:extLst>
-  </p:cSld>
-  <p:clrMapOvr>
-    <a:masterClrMapping/>
-  </p:clrMapOvr>
-  <p:timing>
-    <p:tnLst>
-      <p:par>
-        <p:cTn xmlns:p14="http://schemas.microsoft.com/office/powerpoint/2010/main" id="1" dur="indefinite" restart="never" nodeType="tmRoot"/>
-      </p:par>
-    </p:tnLst>
-  </p:timing>
-</p:sld>
-</file>
-
-<file path=ppt/slides/slide12.xml><?xml version="1.0" encoding="utf-8"?>
-<p:sld xmlns:a="http://schemas.openxmlformats.org/drawingml/2006/main" xmlns:r="http://schemas.openxmlformats.org/officeDocument/2006/relationships" xmlns:p="http://schemas.openxmlformats.org/presentationml/2006/main">
-  <p:cSld>
-    <p:spTree>
-      <p:nvGrpSpPr>
-        <p:cNvPr id="1" name=""/>
-        <p:cNvGrpSpPr/>
-        <p:nvPr/>
-      </p:nvGrpSpPr>
-      <p:grpSpPr>
-        <a:xfrm>
-          <a:off x="0" y="0"/>
-          <a:ext cx="0" cy="0"/>
-          <a:chOff x="0" y="0"/>
-          <a:chExt cx="0" cy="0"/>
-        </a:xfrm>
-      </p:grpSpPr>
-      <p:sp>
-        <p:nvSpPr>
-          <p:cNvPr id="2" name="Title 1"/>
-          <p:cNvSpPr>
-            <a:spLocks noGrp="1"/>
-          </p:cNvSpPr>
-          <p:nvPr>
-            <p:ph type="title"/>
-          </p:nvPr>
-        </p:nvSpPr>
-        <p:spPr/>
-        <p:txBody>
-          <a:bodyPr/>
-          <a:lstStyle/>
-          <a:p>
-            <a:r>
-              <a:rPr lang="en-US" dirty="0" smtClean="0"/>
-              <a:t>Thesis experiment</a:t>
-            </a:r>
-            <a:endParaRPr lang="en-US" dirty="0"/>
-          </a:p>
-        </p:txBody>
-      </p:sp>
-      <p:sp>
-        <p:nvSpPr>
-          <p:cNvPr id="3" name="Content Placeholder 2"/>
-          <p:cNvSpPr>
-            <a:spLocks noGrp="1"/>
-          </p:cNvSpPr>
-          <p:nvPr>
-            <p:ph idx="1"/>
-          </p:nvPr>
-        </p:nvSpPr>
-        <p:spPr/>
-        <p:txBody>
-          <a:bodyPr>
-            <a:normAutofit/>
-          </a:bodyPr>
-          <a:lstStyle/>
-          <a:p>
-            <a:r>
-              <a:rPr lang="en-US" dirty="0" smtClean="0"/>
-              <a:t>Video filtering application with PREESM</a:t>
-            </a:r>
-          </a:p>
-          <a:p>
-            <a:r>
-              <a:rPr lang="en-US" dirty="0" smtClean="0"/>
-              <a:t>Convert the PREESM application to </a:t>
-            </a:r>
-            <a:r>
-              <a:rPr lang="en-US" dirty="0" err="1" smtClean="0"/>
-              <a:t>OpenEM</a:t>
-            </a:r>
-            <a:endParaRPr lang="en-US" dirty="0" smtClean="0"/>
-          </a:p>
-          <a:p>
-            <a:r>
-              <a:rPr lang="en-US" dirty="0" smtClean="0"/>
-              <a:t>Analyze both applications</a:t>
-            </a:r>
-          </a:p>
-          <a:p>
-            <a:pPr lvl="1"/>
-            <a:r>
-              <a:rPr lang="en-US" dirty="0" smtClean="0"/>
-              <a:t>Static analysis</a:t>
-            </a:r>
-          </a:p>
-          <a:p>
-            <a:pPr lvl="1"/>
-            <a:r>
-              <a:rPr lang="en-US" dirty="0" smtClean="0"/>
-              <a:t>Dynamic analysis</a:t>
-            </a:r>
-          </a:p>
-        </p:txBody>
-      </p:sp>
-    </p:spTree>
-    <p:extLst>
-      <p:ext uri="{BB962C8B-B14F-4D97-AF65-F5344CB8AC3E}">
-        <p14:creationId xmlns:p14="http://schemas.microsoft.com/office/powerpoint/2010/main" val="1052199147"/>
-      </p:ext>
-    </p:extLst>
-  </p:cSld>
-  <p:clrMapOvr>
-    <a:masterClrMapping/>
-  </p:clrMapOvr>
-  <p:timing>
-    <p:tnLst>
-      <p:par>
-        <p:cTn xmlns:p14="http://schemas.microsoft.com/office/powerpoint/2010/main" id="1" dur="indefinite" restart="never" nodeType="tmRoot"/>
-      </p:par>
-    </p:tnLst>
-  </p:timing>
-</p:sld>
-</file>
-
-<file path=ppt/slides/slide13.xml><?xml version="1.0" encoding="utf-8"?>
-<p:sld xmlns:a="http://schemas.openxmlformats.org/drawingml/2006/main" xmlns:r="http://schemas.openxmlformats.org/officeDocument/2006/relationships" xmlns:p="http://schemas.openxmlformats.org/presentationml/2006/main">
-  <p:cSld>
-    <p:spTree>
-      <p:nvGrpSpPr>
-        <p:cNvPr id="1" name=""/>
-        <p:cNvGrpSpPr/>
-        <p:nvPr/>
-      </p:nvGrpSpPr>
-      <p:grpSpPr>
-        <a:xfrm>
-          <a:off x="0" y="0"/>
-          <a:ext cx="0" cy="0"/>
-          <a:chOff x="0" y="0"/>
-          <a:chExt cx="0" cy="0"/>
-        </a:xfrm>
-      </p:grpSpPr>
-      <p:sp>
-        <p:nvSpPr>
-          <p:cNvPr id="2" name="Title 1"/>
-          <p:cNvSpPr>
-            <a:spLocks noGrp="1"/>
-          </p:cNvSpPr>
-          <p:nvPr>
-            <p:ph type="title"/>
-          </p:nvPr>
-        </p:nvSpPr>
-        <p:spPr/>
-        <p:txBody>
-          <a:bodyPr>
-            <a:normAutofit fontScale="90000"/>
-          </a:bodyPr>
-          <a:lstStyle/>
-          <a:p>
-            <a:r>
-              <a:rPr lang="en-US" dirty="0" smtClean="0"/>
-              <a:t>Video Filter Application using PREESM</a:t>
-            </a:r>
-            <a:endParaRPr lang="en-US" dirty="0"/>
-          </a:p>
-        </p:txBody>
-      </p:sp>
-      <p:sp>
-        <p:nvSpPr>
-          <p:cNvPr id="3" name="Content Placeholder 2"/>
-          <p:cNvSpPr>
-            <a:spLocks noGrp="1"/>
-          </p:cNvSpPr>
-          <p:nvPr>
-            <p:ph idx="1"/>
-          </p:nvPr>
-        </p:nvSpPr>
-        <p:spPr/>
-        <p:txBody>
-          <a:bodyPr/>
-          <a:lstStyle/>
-          <a:p>
-            <a:r>
-              <a:rPr lang="en-US" dirty="0"/>
-              <a:t>Multiple input video streams</a:t>
-            </a:r>
-          </a:p>
-          <a:p>
-            <a:r>
-              <a:rPr lang="en-US" dirty="0" err="1"/>
-              <a:t>Sobel</a:t>
-            </a:r>
-            <a:r>
-              <a:rPr lang="en-US" dirty="0"/>
-              <a:t> &amp; Gaussian filters capable of processing the same stream on multiple cores</a:t>
-            </a:r>
-          </a:p>
-          <a:p>
-            <a:r>
-              <a:rPr lang="en-US" dirty="0"/>
-              <a:t>Manually scheduled</a:t>
-            </a:r>
-          </a:p>
-          <a:p>
-            <a:pPr lvl="1"/>
-            <a:r>
-              <a:rPr lang="en-US" dirty="0"/>
-              <a:t>Actors divided between cores depending on the number of input streams</a:t>
-            </a:r>
-          </a:p>
-          <a:p>
-            <a:endParaRPr lang="en-US" dirty="0"/>
-          </a:p>
-        </p:txBody>
-      </p:sp>
-    </p:spTree>
-    <p:extLst>
-      <p:ext uri="{BB962C8B-B14F-4D97-AF65-F5344CB8AC3E}">
-        <p14:creationId xmlns:p14="http://schemas.microsoft.com/office/powerpoint/2010/main" val="2838267606"/>
-      </p:ext>
-    </p:extLst>
-  </p:cSld>
-  <p:clrMapOvr>
-    <a:masterClrMapping/>
-  </p:clrMapOvr>
-  <p:timing>
-    <p:tnLst>
-      <p:par>
-        <p:cTn xmlns:p14="http://schemas.microsoft.com/office/powerpoint/2010/main" id="1" dur="indefinite" restart="never" nodeType="tmRoot"/>
-      </p:par>
-    </p:tnLst>
-  </p:timing>
-</p:sld>
-</file>
-
-<file path=ppt/slides/slide14.xml><?xml version="1.0" encoding="utf-8"?>
-<p:sld xmlns:a="http://schemas.openxmlformats.org/drawingml/2006/main" xmlns:r="http://schemas.openxmlformats.org/officeDocument/2006/relationships" xmlns:p="http://schemas.openxmlformats.org/presentationml/2006/main">
-  <p:cSld>
-    <p:spTree>
-      <p:nvGrpSpPr>
-        <p:cNvPr id="1" name=""/>
-        <p:cNvGrpSpPr/>
-        <p:nvPr/>
-      </p:nvGrpSpPr>
-      <p:grpSpPr>
-        <a:xfrm>
-          <a:off x="0" y="0"/>
-          <a:ext cx="0" cy="0"/>
-          <a:chOff x="0" y="0"/>
-          <a:chExt cx="0" cy="0"/>
-        </a:xfrm>
-      </p:grpSpPr>
-      <p:sp>
-        <p:nvSpPr>
-          <p:cNvPr id="2" name="Title 1"/>
-          <p:cNvSpPr>
-            <a:spLocks noGrp="1"/>
-          </p:cNvSpPr>
-          <p:nvPr>
-            <p:ph type="title"/>
-          </p:nvPr>
-        </p:nvSpPr>
-        <p:spPr/>
-        <p:txBody>
-          <a:bodyPr/>
-          <a:lstStyle/>
-          <a:p>
-            <a:r>
-              <a:rPr lang="en-US" dirty="0" smtClean="0"/>
-              <a:t>Actors in </a:t>
-            </a:r>
-            <a:r>
-              <a:rPr lang="en-US" dirty="0" err="1" smtClean="0"/>
-              <a:t>OpenEM</a:t>
-            </a:r>
-            <a:endParaRPr lang="en-US" dirty="0"/>
-          </a:p>
-        </p:txBody>
-      </p:sp>
-      <p:sp>
-        <p:nvSpPr>
-          <p:cNvPr id="3" name="Content Placeholder 2"/>
-          <p:cNvSpPr>
-            <a:spLocks noGrp="1"/>
-          </p:cNvSpPr>
-          <p:nvPr>
-            <p:ph idx="1"/>
-          </p:nvPr>
-        </p:nvSpPr>
-        <p:spPr/>
-        <p:txBody>
-          <a:bodyPr/>
-          <a:lstStyle/>
-          <a:p>
-            <a:r>
-              <a:rPr lang="en-US" dirty="0" smtClean="0"/>
-              <a:t>Map Actors to Execution Objects</a:t>
-            </a:r>
-          </a:p>
-          <a:p>
-            <a:r>
-              <a:rPr lang="en-US" dirty="0" smtClean="0"/>
-              <a:t>PREESM Actor model guarantees memory independency between Actors and the data is moved in static size units</a:t>
-            </a:r>
-          </a:p>
-        </p:txBody>
-      </p:sp>
-    </p:spTree>
-    <p:extLst>
-      <p:ext uri="{BB962C8B-B14F-4D97-AF65-F5344CB8AC3E}">
-        <p14:creationId xmlns:p14="http://schemas.microsoft.com/office/powerpoint/2010/main" val="1538209171"/>
-      </p:ext>
-    </p:extLst>
-  </p:cSld>
-  <p:clrMapOvr>
-    <a:masterClrMapping/>
-  </p:clrMapOvr>
-  <p:timing>
-    <p:tnLst>
-      <p:par>
-        <p:cTn xmlns:p14="http://schemas.microsoft.com/office/powerpoint/2010/main" id="1" dur="indefinite" restart="never" nodeType="tmRoot"/>
-      </p:par>
-    </p:tnLst>
-  </p:timing>
-</p:sld>
-</file>
-
 <file path=ppt/slides/slide15.xml><?xml version="1.0" encoding="utf-8"?>
 <p:sld xmlns:a="http://schemas.openxmlformats.org/drawingml/2006/main" xmlns:r="http://schemas.openxmlformats.org/officeDocument/2006/relationships" xmlns:p="http://schemas.openxmlformats.org/presentationml/2006/main">
   <p:cSld>
@@ -4790,137 +4671,161 @@
         </p:nvSpPr>
         <p:spPr/>
         <p:txBody>
+          <a:bodyPr/>
+          <a:lstStyle/>
+          <a:p>
+            <a:r>
+              <a:rPr lang="en-US" dirty="0" smtClean="0"/>
+              <a:t>PREESM Generated Code for TI	</a:t>
+            </a:r>
+            <a:endParaRPr lang="en-US" dirty="0"/>
+          </a:p>
+        </p:txBody>
+      </p:sp>
+      <p:sp>
+        <p:nvSpPr>
+          <p:cNvPr id="3" name="Content Placeholder 2"/>
+          <p:cNvSpPr>
+            <a:spLocks noGrp="1"/>
+          </p:cNvSpPr>
+          <p:nvPr>
+            <p:ph idx="1"/>
+          </p:nvPr>
+        </p:nvSpPr>
+        <p:spPr/>
+        <p:txBody>
           <a:bodyPr>
-            <a:normAutofit fontScale="90000"/>
+            <a:normAutofit fontScale="85000" lnSpcReduction="10000"/>
           </a:bodyPr>
           <a:lstStyle/>
           <a:p>
             <a:r>
               <a:rPr lang="en-US" dirty="0" smtClean="0"/>
-              <a:t>Implementing the experiment with </a:t>
+              <a:t>PREESM is capable of generating code from the actor model program defined using graphical tools for C6678</a:t>
+            </a:r>
+          </a:p>
+          <a:p>
+            <a:pPr lvl="1"/>
+            <a:r>
+              <a:rPr lang="en-US" dirty="0" smtClean="0"/>
+              <a:t>Eclipse LUNA needed for graphical tools</a:t>
+            </a:r>
+          </a:p>
+          <a:p>
+            <a:r>
+              <a:rPr lang="en-US" dirty="0" smtClean="0"/>
+              <a:t>The generated code requires a custom target platform in CCS which alters the default memory layout</a:t>
+            </a:r>
+          </a:p>
+          <a:p>
+            <a:pPr lvl="1"/>
+            <a:r>
+              <a:rPr lang="en-US" dirty="0" smtClean="0"/>
+              <a:t>5.3 &gt; CCS Version &gt; 5.2 required</a:t>
+            </a:r>
+          </a:p>
+          <a:p>
+            <a:r>
+              <a:rPr lang="en-US" dirty="0" smtClean="0"/>
+              <a:t>Requires sys/bios and </a:t>
             </a:r>
             <a:r>
               <a:rPr lang="en-US" dirty="0" err="1" smtClean="0"/>
-              <a:t>OpenEM</a:t>
+              <a:t>ipc</a:t>
+            </a:r>
+            <a:endParaRPr lang="en-US" dirty="0" smtClean="0"/>
+          </a:p>
+          <a:p>
+            <a:pPr lvl="1"/>
+            <a:r>
+              <a:rPr lang="en-US" dirty="0" smtClean="0"/>
+              <a:t>BIOS MCSDK 2.x</a:t>
+            </a:r>
+          </a:p>
+          <a:p>
+            <a:pPr lvl="1"/>
+            <a:r>
+              <a:rPr lang="en-US" dirty="0" smtClean="0"/>
+              <a:t>&lt;</a:t>
+            </a:r>
+            <a:r>
+              <a:rPr lang="en-US" dirty="0" err="1" smtClean="0"/>
+              <a:t>ti</a:t>
+            </a:r>
+            <a:r>
+              <a:rPr lang="en-US" dirty="0" smtClean="0"/>
+              <a:t>/</a:t>
+            </a:r>
+            <a:r>
+              <a:rPr lang="en-US" dirty="0" err="1" smtClean="0"/>
+              <a:t>ipc</a:t>
+            </a:r>
+            <a:r>
+              <a:rPr lang="en-US" dirty="0" smtClean="0"/>
+              <a:t>/</a:t>
+            </a:r>
+            <a:r>
+              <a:rPr lang="en-US" dirty="0" err="1" smtClean="0"/>
+              <a:t>Ipc.h</a:t>
+            </a:r>
+            <a:r>
+              <a:rPr lang="en-US" dirty="0" smtClean="0"/>
+              <a:t>&gt;</a:t>
+            </a:r>
+          </a:p>
+          <a:p>
+            <a:pPr lvl="1"/>
+            <a:r>
+              <a:rPr lang="en-US" dirty="0" smtClean="0"/>
+              <a:t>&lt;</a:t>
+            </a:r>
+            <a:r>
+              <a:rPr lang="en-US" dirty="0" err="1" smtClean="0"/>
+              <a:t>ti</a:t>
+            </a:r>
+            <a:r>
+              <a:rPr lang="en-US" dirty="0" smtClean="0"/>
+              <a:t>/</a:t>
+            </a:r>
+            <a:r>
+              <a:rPr lang="en-US" dirty="0" err="1" smtClean="0"/>
+              <a:t>sysbios</a:t>
+            </a:r>
+            <a:r>
+              <a:rPr lang="en-US" dirty="0" smtClean="0"/>
+              <a:t>/</a:t>
+            </a:r>
+            <a:r>
+              <a:rPr lang="en-US" dirty="0" err="1" smtClean="0"/>
+              <a:t>knl</a:t>
+            </a:r>
+            <a:r>
+              <a:rPr lang="en-US" dirty="0" smtClean="0"/>
+              <a:t>/</a:t>
+            </a:r>
+            <a:r>
+              <a:rPr lang="en-US" dirty="0" err="1" smtClean="0"/>
+              <a:t>Semaphore.h</a:t>
+            </a:r>
+            <a:r>
+              <a:rPr lang="en-US" dirty="0" smtClean="0"/>
+              <a:t>&gt;</a:t>
+            </a:r>
+          </a:p>
+          <a:p>
+            <a:pPr lvl="1"/>
+            <a:r>
+              <a:rPr lang="en-US" dirty="0" err="1" smtClean="0"/>
+              <a:t>etc</a:t>
             </a:r>
             <a:endParaRPr lang="en-US" dirty="0"/>
-          </a:p>
-        </p:txBody>
-      </p:sp>
-      <p:sp>
-        <p:nvSpPr>
-          <p:cNvPr id="3" name="Content Placeholder 2"/>
-          <p:cNvSpPr>
-            <a:spLocks noGrp="1"/>
-          </p:cNvSpPr>
-          <p:nvPr>
-            <p:ph idx="1"/>
-          </p:nvPr>
-        </p:nvSpPr>
-        <p:spPr/>
-        <p:txBody>
-          <a:bodyPr>
-            <a:normAutofit fontScale="85000" lnSpcReduction="20000"/>
-          </a:bodyPr>
-          <a:lstStyle/>
-          <a:p>
-            <a:r>
-              <a:rPr lang="en-US" dirty="0" smtClean="0"/>
-              <a:t>Input</a:t>
-            </a:r>
-          </a:p>
-          <a:p>
-            <a:pPr lvl="1"/>
-            <a:r>
-              <a:rPr lang="en-US" dirty="0" smtClean="0"/>
-              <a:t>Data preloaded in to memory</a:t>
-            </a:r>
-          </a:p>
-          <a:p>
-            <a:pPr lvl="1"/>
-            <a:r>
-              <a:rPr lang="en-US" dirty="0" smtClean="0"/>
-              <a:t>A regular for loop </a:t>
-            </a:r>
-            <a:r>
-              <a:rPr lang="en-US" dirty="0" err="1" smtClean="0"/>
-              <a:t>em_allocing</a:t>
-            </a:r>
-            <a:r>
-              <a:rPr lang="en-US" dirty="0" smtClean="0"/>
-              <a:t> events outside the </a:t>
-            </a:r>
-            <a:r>
-              <a:rPr lang="en-US" dirty="0" err="1" smtClean="0"/>
-              <a:t>OpenEM</a:t>
-            </a:r>
-            <a:r>
-              <a:rPr lang="en-US" dirty="0" smtClean="0"/>
-              <a:t> operating context</a:t>
-            </a:r>
-          </a:p>
-          <a:p>
-            <a:pPr lvl="1"/>
-            <a:r>
-              <a:rPr lang="en-US" dirty="0" smtClean="0"/>
-              <a:t>Low priority Queue for input events that </a:t>
-            </a:r>
-            <a:r>
-              <a:rPr lang="en-US" dirty="0" err="1" smtClean="0"/>
-              <a:t>em_alloc</a:t>
-            </a:r>
-            <a:r>
-              <a:rPr lang="en-US" dirty="0" smtClean="0"/>
-              <a:t> actual data events and new input events</a:t>
-            </a:r>
-          </a:p>
-          <a:p>
-            <a:r>
-              <a:rPr lang="en-US" dirty="0" smtClean="0"/>
-              <a:t>Output</a:t>
-            </a:r>
-          </a:p>
-          <a:p>
-            <a:pPr lvl="1"/>
-            <a:r>
-              <a:rPr lang="en-US" dirty="0" smtClean="0"/>
-              <a:t>Low priority queues which collect events holding the results that are allocated by the actual filter EO</a:t>
-            </a:r>
-          </a:p>
-          <a:p>
-            <a:pPr lvl="1"/>
-            <a:r>
-              <a:rPr lang="en-US" dirty="0" smtClean="0"/>
-              <a:t>Collect statistics and free events</a:t>
-            </a:r>
-          </a:p>
-          <a:p>
-            <a:r>
-              <a:rPr lang="en-US" dirty="0" smtClean="0"/>
-              <a:t>Processing</a:t>
-            </a:r>
-          </a:p>
-          <a:p>
-            <a:pPr lvl="1"/>
-            <a:r>
-              <a:rPr lang="en-US" dirty="0" smtClean="0"/>
-              <a:t>Filters implemented as Execution objects</a:t>
-            </a:r>
-          </a:p>
-          <a:p>
-            <a:pPr lvl="1"/>
-            <a:endParaRPr lang="en-US" dirty="0" smtClean="0"/>
-          </a:p>
-          <a:p>
-            <a:pPr lvl="1"/>
-            <a:endParaRPr lang="en-US" dirty="0" smtClean="0"/>
           </a:p>
         </p:txBody>
       </p:sp>
     </p:spTree>
     <p:extLst>
       <p:ext uri="{BB962C8B-B14F-4D97-AF65-F5344CB8AC3E}">
-        <p14:creationId xmlns:p14="http://schemas.microsoft.com/office/powerpoint/2010/main" val="3545089472"/>
+        <p14:creationId xmlns:p14="http://schemas.microsoft.com/office/powerpoint/2010/main" val="1240314304"/>
       </p:ext>
     </p:extLst>
   </p:cSld>
@@ -4971,7 +4876,7 @@
           <a:p>
             <a:r>
               <a:rPr lang="en-US" dirty="0" smtClean="0"/>
-              <a:t>I/O</a:t>
+              <a:t>Thesis experiment</a:t>
             </a:r>
             <a:endParaRPr lang="en-US" dirty="0"/>
           </a:p>
@@ -4990,63 +4895,44 @@
         <p:spPr/>
         <p:txBody>
           <a:bodyPr>
-            <a:normAutofit fontScale="92500" lnSpcReduction="10000"/>
+            <a:normAutofit/>
           </a:bodyPr>
           <a:lstStyle/>
           <a:p>
             <a:r>
               <a:rPr lang="en-US" dirty="0" smtClean="0"/>
-              <a:t>This thesis does not take the effect of I/O in to account</a:t>
-            </a:r>
-          </a:p>
-          <a:p>
-            <a:r>
-              <a:rPr lang="en-US" dirty="0" smtClean="0"/>
-              <a:t>The video streams are preloaded in to memory and there is no output stream</a:t>
-            </a:r>
-          </a:p>
-          <a:p>
-            <a:r>
-              <a:rPr lang="en-US" dirty="0" smtClean="0"/>
-              <a:t>The TMS320C6678 contains a switch fabric called </a:t>
+              <a:t>Video filtering application with PREESM</a:t>
+            </a:r>
+          </a:p>
+          <a:p>
+            <a:r>
+              <a:rPr lang="en-US" dirty="0" smtClean="0"/>
+              <a:t>Convert the PREESM application to </a:t>
             </a:r>
             <a:r>
               <a:rPr lang="en-US" dirty="0" err="1" smtClean="0"/>
-              <a:t>TeraNet</a:t>
-            </a:r>
-            <a:r>
-              <a:rPr lang="en-US" dirty="0" smtClean="0"/>
-              <a:t> which connects the Multicore Shared Memory Controller with peripherals</a:t>
-            </a:r>
-          </a:p>
-          <a:p>
-            <a:r>
-              <a:rPr lang="en-US" dirty="0" smtClean="0"/>
-              <a:t>The </a:t>
-            </a:r>
-            <a:r>
-              <a:rPr lang="en-US" dirty="0" err="1" smtClean="0"/>
-              <a:t>TeraNet</a:t>
-            </a:r>
-            <a:r>
-              <a:rPr lang="en-US" dirty="0" smtClean="0"/>
-              <a:t> is connected to </a:t>
-            </a:r>
-            <a:r>
-              <a:rPr lang="en-US" dirty="0" err="1" smtClean="0"/>
-              <a:t>ethernet</a:t>
-            </a:r>
-            <a:r>
-              <a:rPr lang="en-US" dirty="0" smtClean="0"/>
-              <a:t> and </a:t>
-            </a:r>
-            <a:r>
-              <a:rPr lang="en-US" dirty="0" err="1" smtClean="0"/>
-              <a:t>PCIe</a:t>
-            </a:r>
-            <a:r>
-              <a:rPr lang="en-US" dirty="0" smtClean="0"/>
-              <a:t> both of which could function as the external I/O interface</a:t>
+              <a:t>OpenEM</a:t>
+            </a:r>
+            <a:endParaRPr lang="en-US" dirty="0" smtClean="0"/>
+          </a:p>
+          <a:p>
+            <a:r>
+              <a:rPr lang="en-US" dirty="0" smtClean="0"/>
+              <a:t>Analyze both applications</a:t>
+            </a:r>
+          </a:p>
+          <a:p>
+            <a:pPr lvl="1"/>
+            <a:r>
+              <a:rPr lang="en-US" dirty="0" smtClean="0"/>
+              <a:t>Static analysis</a:t>
+            </a:r>
+          </a:p>
+          <a:p>
+            <a:pPr lvl="1"/>
+            <a:r>
+              <a:rPr lang="en-US" dirty="0" smtClean="0"/>
+              <a:t>Dynamic analysis</a:t>
             </a:r>
           </a:p>
         </p:txBody>
@@ -5054,7 +4940,7 @@
     </p:spTree>
     <p:extLst>
       <p:ext uri="{BB962C8B-B14F-4D97-AF65-F5344CB8AC3E}">
-        <p14:creationId xmlns:p14="http://schemas.microsoft.com/office/powerpoint/2010/main" val="1275643183"/>
+        <p14:creationId xmlns:p14="http://schemas.microsoft.com/office/powerpoint/2010/main" val="1052199147"/>
       </p:ext>
     </p:extLst>
   </p:cSld>
@@ -5100,12 +4986,14 @@
         </p:nvSpPr>
         <p:spPr/>
         <p:txBody>
-          <a:bodyPr/>
-          <a:lstStyle/>
-          <a:p>
-            <a:r>
-              <a:rPr lang="en-US" dirty="0" smtClean="0"/>
-              <a:t>Analysis</a:t>
+          <a:bodyPr>
+            <a:normAutofit fontScale="90000"/>
+          </a:bodyPr>
+          <a:lstStyle/>
+          <a:p>
+            <a:r>
+              <a:rPr lang="en-US" dirty="0" smtClean="0"/>
+              <a:t>Video Filter Application using PREESM</a:t>
             </a:r>
             <a:endParaRPr lang="en-US" dirty="0"/>
           </a:p>
@@ -5127,32 +5015,32 @@
           <a:lstStyle/>
           <a:p>
             <a:r>
-              <a:rPr lang="en-US" dirty="0" smtClean="0"/>
-              <a:t>PSE – dynamic</a:t>
+              <a:rPr lang="en-US" dirty="0"/>
+              <a:t>Multiple input video streams</a:t>
+            </a:r>
+          </a:p>
+          <a:p>
+            <a:r>
+              <a:rPr lang="en-US" dirty="0" err="1"/>
+              <a:t>Sobel</a:t>
+            </a:r>
+            <a:r>
+              <a:rPr lang="en-US" dirty="0"/>
+              <a:t> &amp; Gaussian filters capable of processing the same stream on multiple cores</a:t>
+            </a:r>
+          </a:p>
+          <a:p>
+            <a:r>
+              <a:rPr lang="en-US" dirty="0"/>
+              <a:t>Manually scheduled</a:t>
             </a:r>
           </a:p>
           <a:p>
             <a:pPr lvl="1"/>
             <a:r>
-              <a:rPr lang="en-US" dirty="0" smtClean="0"/>
-              <a:t>Sketch a PSE model</a:t>
-            </a:r>
-          </a:p>
-          <a:p>
-            <a:r>
-              <a:rPr lang="en-US" dirty="0" smtClean="0"/>
-              <a:t>Static analysis tool</a:t>
-            </a:r>
-          </a:p>
-          <a:p>
-            <a:pPr lvl="1"/>
-            <a:r>
-              <a:rPr lang="en-US" dirty="0" smtClean="0"/>
-              <a:t>TI doesn’t provide one (?)</a:t>
-            </a:r>
-          </a:p>
-          <a:p>
-            <a:endParaRPr lang="en-US" dirty="0" smtClean="0"/>
+              <a:rPr lang="en-US" dirty="0"/>
+              <a:t>Actors divided between cores depending on the number of input streams</a:t>
+            </a:r>
           </a:p>
           <a:p>
             <a:endParaRPr lang="en-US" dirty="0"/>
@@ -5162,7 +5050,275 @@
     </p:spTree>
     <p:extLst>
       <p:ext uri="{BB962C8B-B14F-4D97-AF65-F5344CB8AC3E}">
-        <p14:creationId xmlns:p14="http://schemas.microsoft.com/office/powerpoint/2010/main" val="2633794267"/>
+        <p14:creationId xmlns:p14="http://schemas.microsoft.com/office/powerpoint/2010/main" val="2838267606"/>
+      </p:ext>
+    </p:extLst>
+  </p:cSld>
+  <p:clrMapOvr>
+    <a:masterClrMapping/>
+  </p:clrMapOvr>
+  <p:timing>
+    <p:tnLst>
+      <p:par>
+        <p:cTn xmlns:p14="http://schemas.microsoft.com/office/powerpoint/2010/main" id="1" dur="indefinite" restart="never" nodeType="tmRoot"/>
+      </p:par>
+    </p:tnLst>
+  </p:timing>
+</p:sld>
+</file>
+
+<file path=ppt/slides/slide18.xml><?xml version="1.0" encoding="utf-8"?>
+<p:sld xmlns:a="http://schemas.openxmlformats.org/drawingml/2006/main" xmlns:r="http://schemas.openxmlformats.org/officeDocument/2006/relationships" xmlns:p="http://schemas.openxmlformats.org/presentationml/2006/main">
+  <p:cSld>
+    <p:spTree>
+      <p:nvGrpSpPr>
+        <p:cNvPr id="1" name=""/>
+        <p:cNvGrpSpPr/>
+        <p:nvPr/>
+      </p:nvGrpSpPr>
+      <p:grpSpPr>
+        <a:xfrm>
+          <a:off x="0" y="0"/>
+          <a:ext cx="0" cy="0"/>
+          <a:chOff x="0" y="0"/>
+          <a:chExt cx="0" cy="0"/>
+        </a:xfrm>
+      </p:grpSpPr>
+      <p:sp>
+        <p:nvSpPr>
+          <p:cNvPr id="2" name="Title 1"/>
+          <p:cNvSpPr>
+            <a:spLocks noGrp="1"/>
+          </p:cNvSpPr>
+          <p:nvPr>
+            <p:ph type="title"/>
+          </p:nvPr>
+        </p:nvSpPr>
+        <p:spPr/>
+        <p:txBody>
+          <a:bodyPr/>
+          <a:lstStyle/>
+          <a:p>
+            <a:r>
+              <a:rPr lang="en-US" dirty="0" smtClean="0"/>
+              <a:t>Actors in </a:t>
+            </a:r>
+            <a:r>
+              <a:rPr lang="en-US" dirty="0" err="1" smtClean="0"/>
+              <a:t>OpenEM</a:t>
+            </a:r>
+            <a:endParaRPr lang="en-US" dirty="0"/>
+          </a:p>
+        </p:txBody>
+      </p:sp>
+      <p:sp>
+        <p:nvSpPr>
+          <p:cNvPr id="3" name="Content Placeholder 2"/>
+          <p:cNvSpPr>
+            <a:spLocks noGrp="1"/>
+          </p:cNvSpPr>
+          <p:nvPr>
+            <p:ph idx="1"/>
+          </p:nvPr>
+        </p:nvSpPr>
+        <p:spPr/>
+        <p:txBody>
+          <a:bodyPr/>
+          <a:lstStyle/>
+          <a:p>
+            <a:r>
+              <a:rPr lang="en-US" dirty="0" smtClean="0"/>
+              <a:t>Map Actors to Execution Objects</a:t>
+            </a:r>
+          </a:p>
+          <a:p>
+            <a:r>
+              <a:rPr lang="en-US" dirty="0" smtClean="0"/>
+              <a:t>PREESM Actor model guarantees memory independency between Actors and the data is moved in static size units</a:t>
+            </a:r>
+          </a:p>
+        </p:txBody>
+      </p:sp>
+    </p:spTree>
+    <p:extLst>
+      <p:ext uri="{BB962C8B-B14F-4D97-AF65-F5344CB8AC3E}">
+        <p14:creationId xmlns:p14="http://schemas.microsoft.com/office/powerpoint/2010/main" val="1538209171"/>
+      </p:ext>
+    </p:extLst>
+  </p:cSld>
+  <p:clrMapOvr>
+    <a:masterClrMapping/>
+  </p:clrMapOvr>
+  <p:timing>
+    <p:tnLst>
+      <p:par>
+        <p:cTn xmlns:p14="http://schemas.microsoft.com/office/powerpoint/2010/main" id="1" dur="indefinite" restart="never" nodeType="tmRoot"/>
+      </p:par>
+    </p:tnLst>
+  </p:timing>
+</p:sld>
+</file>
+
+<file path=ppt/slides/slide19.xml><?xml version="1.0" encoding="utf-8"?>
+<p:sld xmlns:a="http://schemas.openxmlformats.org/drawingml/2006/main" xmlns:r="http://schemas.openxmlformats.org/officeDocument/2006/relationships" xmlns:p="http://schemas.openxmlformats.org/presentationml/2006/main">
+  <p:cSld>
+    <p:spTree>
+      <p:nvGrpSpPr>
+        <p:cNvPr id="1" name=""/>
+        <p:cNvGrpSpPr/>
+        <p:nvPr/>
+      </p:nvGrpSpPr>
+      <p:grpSpPr>
+        <a:xfrm>
+          <a:off x="0" y="0"/>
+          <a:ext cx="0" cy="0"/>
+          <a:chOff x="0" y="0"/>
+          <a:chExt cx="0" cy="0"/>
+        </a:xfrm>
+      </p:grpSpPr>
+      <p:sp>
+        <p:nvSpPr>
+          <p:cNvPr id="2" name="Title 1"/>
+          <p:cNvSpPr>
+            <a:spLocks noGrp="1"/>
+          </p:cNvSpPr>
+          <p:nvPr>
+            <p:ph type="title"/>
+          </p:nvPr>
+        </p:nvSpPr>
+        <p:spPr/>
+        <p:txBody>
+          <a:bodyPr>
+            <a:normAutofit fontScale="90000"/>
+          </a:bodyPr>
+          <a:lstStyle/>
+          <a:p>
+            <a:r>
+              <a:rPr lang="en-US" dirty="0" smtClean="0"/>
+              <a:t>Implementing the experiment with </a:t>
+            </a:r>
+            <a:r>
+              <a:rPr lang="en-US" dirty="0" err="1" smtClean="0"/>
+              <a:t>OpenEM</a:t>
+            </a:r>
+            <a:endParaRPr lang="en-US" dirty="0"/>
+          </a:p>
+        </p:txBody>
+      </p:sp>
+      <p:sp>
+        <p:nvSpPr>
+          <p:cNvPr id="3" name="Content Placeholder 2"/>
+          <p:cNvSpPr>
+            <a:spLocks noGrp="1"/>
+          </p:cNvSpPr>
+          <p:nvPr>
+            <p:ph idx="1"/>
+          </p:nvPr>
+        </p:nvSpPr>
+        <p:spPr/>
+        <p:txBody>
+          <a:bodyPr>
+            <a:normAutofit fontScale="85000" lnSpcReduction="20000"/>
+          </a:bodyPr>
+          <a:lstStyle/>
+          <a:p>
+            <a:r>
+              <a:rPr lang="en-US" dirty="0" smtClean="0"/>
+              <a:t>Input</a:t>
+            </a:r>
+          </a:p>
+          <a:p>
+            <a:pPr lvl="1"/>
+            <a:r>
+              <a:rPr lang="en-US" dirty="0" smtClean="0"/>
+              <a:t>Data preloaded in to memory</a:t>
+            </a:r>
+          </a:p>
+          <a:p>
+            <a:pPr lvl="1"/>
+            <a:r>
+              <a:rPr lang="en-US" dirty="0" smtClean="0"/>
+              <a:t>A regular for loop </a:t>
+            </a:r>
+            <a:r>
+              <a:rPr lang="en-US" dirty="0" err="1" smtClean="0"/>
+              <a:t>em_allocing</a:t>
+            </a:r>
+            <a:r>
+              <a:rPr lang="en-US" dirty="0" smtClean="0"/>
+              <a:t> events outside the </a:t>
+            </a:r>
+            <a:r>
+              <a:rPr lang="en-US" dirty="0" err="1" smtClean="0"/>
+              <a:t>OpenEM</a:t>
+            </a:r>
+            <a:r>
+              <a:rPr lang="en-US" dirty="0" smtClean="0"/>
+              <a:t> operating context</a:t>
+            </a:r>
+          </a:p>
+          <a:p>
+            <a:pPr lvl="1"/>
+            <a:r>
+              <a:rPr lang="en-US" dirty="0" smtClean="0"/>
+              <a:t>Low priority Queue for input events that </a:t>
+            </a:r>
+            <a:r>
+              <a:rPr lang="en-US" dirty="0" err="1" smtClean="0"/>
+              <a:t>em_alloc</a:t>
+            </a:r>
+            <a:r>
+              <a:rPr lang="en-US" dirty="0" smtClean="0"/>
+              <a:t> actual data events and new input events</a:t>
+            </a:r>
+          </a:p>
+          <a:p>
+            <a:r>
+              <a:rPr lang="en-US" dirty="0" smtClean="0"/>
+              <a:t>Output</a:t>
+            </a:r>
+          </a:p>
+          <a:p>
+            <a:pPr lvl="1"/>
+            <a:r>
+              <a:rPr lang="en-US" dirty="0" smtClean="0"/>
+              <a:t>Low priority queues which collect events holding the results that are allocated by the actual filter EO</a:t>
+            </a:r>
+          </a:p>
+          <a:p>
+            <a:pPr lvl="1"/>
+            <a:r>
+              <a:rPr lang="en-US" dirty="0" smtClean="0"/>
+              <a:t>Collect statistics and free events</a:t>
+            </a:r>
+          </a:p>
+          <a:p>
+            <a:r>
+              <a:rPr lang="en-US" dirty="0" smtClean="0"/>
+              <a:t>Processing</a:t>
+            </a:r>
+          </a:p>
+          <a:p>
+            <a:pPr lvl="1"/>
+            <a:r>
+              <a:rPr lang="en-US" dirty="0" smtClean="0"/>
+              <a:t>Filters implemented as Execution objects</a:t>
+            </a:r>
+          </a:p>
+          <a:p>
+            <a:pPr lvl="1"/>
+            <a:endParaRPr lang="en-US" dirty="0" smtClean="0"/>
+          </a:p>
+          <a:p>
+            <a:pPr lvl="1"/>
+            <a:endParaRPr lang="en-US" dirty="0" smtClean="0"/>
+          </a:p>
+        </p:txBody>
+      </p:sp>
+    </p:spTree>
+    <p:extLst>
+      <p:ext uri="{BB962C8B-B14F-4D97-AF65-F5344CB8AC3E}">
+        <p14:creationId xmlns:p14="http://schemas.microsoft.com/office/powerpoint/2010/main" val="3545089472"/>
       </p:ext>
     </p:extLst>
   </p:cSld>
@@ -5258,6 +5414,248 @@
     <p:extLst>
       <p:ext uri="{BB962C8B-B14F-4D97-AF65-F5344CB8AC3E}">
         <p14:creationId xmlns:p14="http://schemas.microsoft.com/office/powerpoint/2010/main" val="28481937"/>
+      </p:ext>
+    </p:extLst>
+  </p:cSld>
+  <p:clrMapOvr>
+    <a:masterClrMapping/>
+  </p:clrMapOvr>
+  <p:timing>
+    <p:tnLst>
+      <p:par>
+        <p:cTn xmlns:p14="http://schemas.microsoft.com/office/powerpoint/2010/main" id="1" dur="indefinite" restart="never" nodeType="tmRoot"/>
+      </p:par>
+    </p:tnLst>
+  </p:timing>
+</p:sld>
+</file>
+
+<file path=ppt/slides/slide20.xml><?xml version="1.0" encoding="utf-8"?>
+<p:sld xmlns:a="http://schemas.openxmlformats.org/drawingml/2006/main" xmlns:r="http://schemas.openxmlformats.org/officeDocument/2006/relationships" xmlns:p="http://schemas.openxmlformats.org/presentationml/2006/main">
+  <p:cSld>
+    <p:spTree>
+      <p:nvGrpSpPr>
+        <p:cNvPr id="1" name=""/>
+        <p:cNvGrpSpPr/>
+        <p:nvPr/>
+      </p:nvGrpSpPr>
+      <p:grpSpPr>
+        <a:xfrm>
+          <a:off x="0" y="0"/>
+          <a:ext cx="0" cy="0"/>
+          <a:chOff x="0" y="0"/>
+          <a:chExt cx="0" cy="0"/>
+        </a:xfrm>
+      </p:grpSpPr>
+      <p:sp>
+        <p:nvSpPr>
+          <p:cNvPr id="2" name="Title 1"/>
+          <p:cNvSpPr>
+            <a:spLocks noGrp="1"/>
+          </p:cNvSpPr>
+          <p:nvPr>
+            <p:ph type="title"/>
+          </p:nvPr>
+        </p:nvSpPr>
+        <p:spPr/>
+        <p:txBody>
+          <a:bodyPr/>
+          <a:lstStyle/>
+          <a:p>
+            <a:r>
+              <a:rPr lang="en-US" dirty="0" smtClean="0"/>
+              <a:t>I/O</a:t>
+            </a:r>
+            <a:endParaRPr lang="en-US" dirty="0"/>
+          </a:p>
+        </p:txBody>
+      </p:sp>
+      <p:sp>
+        <p:nvSpPr>
+          <p:cNvPr id="3" name="Content Placeholder 2"/>
+          <p:cNvSpPr>
+            <a:spLocks noGrp="1"/>
+          </p:cNvSpPr>
+          <p:nvPr>
+            <p:ph idx="1"/>
+          </p:nvPr>
+        </p:nvSpPr>
+        <p:spPr/>
+        <p:txBody>
+          <a:bodyPr>
+            <a:normAutofit fontScale="92500" lnSpcReduction="10000"/>
+          </a:bodyPr>
+          <a:lstStyle/>
+          <a:p>
+            <a:r>
+              <a:rPr lang="en-US" dirty="0" smtClean="0"/>
+              <a:t>This thesis does not take the effect of I/O in to account</a:t>
+            </a:r>
+          </a:p>
+          <a:p>
+            <a:r>
+              <a:rPr lang="en-US" dirty="0" smtClean="0"/>
+              <a:t>The video streams are preloaded in to memory and there is no output stream</a:t>
+            </a:r>
+          </a:p>
+          <a:p>
+            <a:r>
+              <a:rPr lang="en-US" dirty="0" smtClean="0"/>
+              <a:t>The TMS320C6678 contains a switch fabric called </a:t>
+            </a:r>
+            <a:r>
+              <a:rPr lang="en-US" dirty="0" err="1" smtClean="0"/>
+              <a:t>TeraNet</a:t>
+            </a:r>
+            <a:r>
+              <a:rPr lang="en-US" dirty="0" smtClean="0"/>
+              <a:t> which connects the Multicore Shared Memory Controller with peripherals</a:t>
+            </a:r>
+          </a:p>
+          <a:p>
+            <a:r>
+              <a:rPr lang="en-US" dirty="0" smtClean="0"/>
+              <a:t>The </a:t>
+            </a:r>
+            <a:r>
+              <a:rPr lang="en-US" dirty="0" err="1" smtClean="0"/>
+              <a:t>TeraNet</a:t>
+            </a:r>
+            <a:r>
+              <a:rPr lang="en-US" dirty="0" smtClean="0"/>
+              <a:t> is connected to </a:t>
+            </a:r>
+            <a:r>
+              <a:rPr lang="en-US" dirty="0" err="1" smtClean="0"/>
+              <a:t>ethernet</a:t>
+            </a:r>
+            <a:r>
+              <a:rPr lang="en-US" dirty="0" smtClean="0"/>
+              <a:t> and </a:t>
+            </a:r>
+            <a:r>
+              <a:rPr lang="en-US" dirty="0" err="1" smtClean="0"/>
+              <a:t>PCIe</a:t>
+            </a:r>
+            <a:r>
+              <a:rPr lang="en-US" dirty="0" smtClean="0"/>
+              <a:t> both of which could function as the external I/O interface</a:t>
+            </a:r>
+          </a:p>
+        </p:txBody>
+      </p:sp>
+    </p:spTree>
+    <p:extLst>
+      <p:ext uri="{BB962C8B-B14F-4D97-AF65-F5344CB8AC3E}">
+        <p14:creationId xmlns:p14="http://schemas.microsoft.com/office/powerpoint/2010/main" val="1275643183"/>
+      </p:ext>
+    </p:extLst>
+  </p:cSld>
+  <p:clrMapOvr>
+    <a:masterClrMapping/>
+  </p:clrMapOvr>
+  <p:timing>
+    <p:tnLst>
+      <p:par>
+        <p:cTn xmlns:p14="http://schemas.microsoft.com/office/powerpoint/2010/main" id="1" dur="indefinite" restart="never" nodeType="tmRoot"/>
+      </p:par>
+    </p:tnLst>
+  </p:timing>
+</p:sld>
+</file>
+
+<file path=ppt/slides/slide21.xml><?xml version="1.0" encoding="utf-8"?>
+<p:sld xmlns:a="http://schemas.openxmlformats.org/drawingml/2006/main" xmlns:r="http://schemas.openxmlformats.org/officeDocument/2006/relationships" xmlns:p="http://schemas.openxmlformats.org/presentationml/2006/main">
+  <p:cSld>
+    <p:spTree>
+      <p:nvGrpSpPr>
+        <p:cNvPr id="1" name=""/>
+        <p:cNvGrpSpPr/>
+        <p:nvPr/>
+      </p:nvGrpSpPr>
+      <p:grpSpPr>
+        <a:xfrm>
+          <a:off x="0" y="0"/>
+          <a:ext cx="0" cy="0"/>
+          <a:chOff x="0" y="0"/>
+          <a:chExt cx="0" cy="0"/>
+        </a:xfrm>
+      </p:grpSpPr>
+      <p:sp>
+        <p:nvSpPr>
+          <p:cNvPr id="2" name="Title 1"/>
+          <p:cNvSpPr>
+            <a:spLocks noGrp="1"/>
+          </p:cNvSpPr>
+          <p:nvPr>
+            <p:ph type="title"/>
+          </p:nvPr>
+        </p:nvSpPr>
+        <p:spPr/>
+        <p:txBody>
+          <a:bodyPr/>
+          <a:lstStyle/>
+          <a:p>
+            <a:r>
+              <a:rPr lang="en-US" dirty="0" smtClean="0"/>
+              <a:t>Analysis</a:t>
+            </a:r>
+            <a:endParaRPr lang="en-US" dirty="0"/>
+          </a:p>
+        </p:txBody>
+      </p:sp>
+      <p:sp>
+        <p:nvSpPr>
+          <p:cNvPr id="3" name="Content Placeholder 2"/>
+          <p:cNvSpPr>
+            <a:spLocks noGrp="1"/>
+          </p:cNvSpPr>
+          <p:nvPr>
+            <p:ph idx="1"/>
+          </p:nvPr>
+        </p:nvSpPr>
+        <p:spPr/>
+        <p:txBody>
+          <a:bodyPr/>
+          <a:lstStyle/>
+          <a:p>
+            <a:r>
+              <a:rPr lang="en-US" dirty="0" smtClean="0"/>
+              <a:t>PSE – dynamic</a:t>
+            </a:r>
+          </a:p>
+          <a:p>
+            <a:pPr lvl="1"/>
+            <a:r>
+              <a:rPr lang="en-US" dirty="0" smtClean="0"/>
+              <a:t>Sketch a PSE model</a:t>
+            </a:r>
+          </a:p>
+          <a:p>
+            <a:r>
+              <a:rPr lang="en-US" dirty="0" smtClean="0"/>
+              <a:t>Static analysis tool</a:t>
+            </a:r>
+          </a:p>
+          <a:p>
+            <a:pPr lvl="1"/>
+            <a:r>
+              <a:rPr lang="en-US" dirty="0" smtClean="0"/>
+              <a:t>TI doesn’t provide one (?)</a:t>
+            </a:r>
+          </a:p>
+          <a:p>
+            <a:endParaRPr lang="en-US" dirty="0" smtClean="0"/>
+          </a:p>
+          <a:p>
+            <a:endParaRPr lang="en-US" dirty="0"/>
+          </a:p>
+        </p:txBody>
+      </p:sp>
+    </p:spTree>
+    <p:extLst>
+      <p:ext uri="{BB962C8B-B14F-4D97-AF65-F5344CB8AC3E}">
+        <p14:creationId xmlns:p14="http://schemas.microsoft.com/office/powerpoint/2010/main" val="2633794267"/>
       </p:ext>
     </p:extLst>
   </p:cSld>
@@ -6063,7 +6461,7 @@
           <a:p>
             <a:r>
               <a:rPr lang="en-US" dirty="0" smtClean="0"/>
-              <a:t>Memory allocation</a:t>
+              <a:t>Memory areas 1/2</a:t>
             </a:r>
             <a:endParaRPr lang="en-US" dirty="0"/>
           </a:p>
@@ -6081,162 +6479,42 @@
         </p:nvSpPr>
         <p:spPr/>
         <p:txBody>
-          <a:bodyPr>
-            <a:normAutofit fontScale="77500" lnSpcReduction="20000"/>
-          </a:bodyPr>
-          <a:lstStyle/>
-          <a:p>
-            <a:r>
-              <a:rPr lang="en-US" dirty="0"/>
-              <a:t>.</a:t>
-            </a:r>
-            <a:r>
-              <a:rPr lang="en-US" dirty="0" smtClean="0"/>
-              <a:t>tiEmSvPrivateEventDscMem1</a:t>
-            </a:r>
-          </a:p>
-          <a:p>
-            <a:pPr lvl="1"/>
-            <a:r>
-              <a:rPr lang="en-US" dirty="0" smtClean="0"/>
-              <a:t>memory</a:t>
-            </a:r>
-            <a:r>
-              <a:rPr lang="en-US" dirty="0"/>
-              <a:t>: QMSS </a:t>
-            </a:r>
-            <a:r>
-              <a:rPr lang="en-US" dirty="0" smtClean="0"/>
-              <a:t>RAM</a:t>
-            </a:r>
-          </a:p>
-          <a:p>
-            <a:pPr lvl="1"/>
-            <a:r>
-              <a:rPr lang="en-US" dirty="0" smtClean="0"/>
-              <a:t>alignment</a:t>
-            </a:r>
-            <a:r>
-              <a:rPr lang="en-US" dirty="0"/>
-              <a:t>: </a:t>
-            </a:r>
-            <a:r>
-              <a:rPr lang="en-US" dirty="0" smtClean="0"/>
-              <a:t>CACHE_L2_LINESIZE</a:t>
-            </a:r>
-          </a:p>
-          <a:p>
-            <a:r>
-              <a:rPr lang="en-US" dirty="0" smtClean="0"/>
-              <a:t>.tiEmSvPrivateEventDscMem2 </a:t>
-            </a:r>
-            <a:endParaRPr lang="en-US" dirty="0"/>
-          </a:p>
-          <a:p>
-            <a:pPr lvl="1"/>
-            <a:r>
-              <a:rPr lang="en-US" dirty="0" smtClean="0"/>
-              <a:t>memory</a:t>
-            </a:r>
-            <a:r>
-              <a:rPr lang="en-US" dirty="0"/>
-              <a:t>: QMSS RAM </a:t>
-            </a:r>
-            <a:endParaRPr lang="en-US" dirty="0"/>
-          </a:p>
-          <a:p>
-            <a:pPr lvl="1"/>
-            <a:r>
-              <a:rPr lang="en-US" dirty="0" smtClean="0"/>
-              <a:t>alignment</a:t>
-            </a:r>
-            <a:r>
-              <a:rPr lang="en-US" dirty="0"/>
-              <a:t>: CACHE_L2_LINESIZE </a:t>
-            </a:r>
-            <a:endParaRPr lang="en-US" dirty="0"/>
-          </a:p>
-          <a:p>
-            <a:r>
-              <a:rPr lang="en-US" dirty="0" smtClean="0"/>
-              <a:t>.</a:t>
-            </a:r>
-            <a:r>
-              <a:rPr lang="en-US" dirty="0" err="1"/>
-              <a:t>tiEmSvPublicEventDscMem</a:t>
-            </a:r>
-            <a:r>
-              <a:rPr lang="en-US" dirty="0"/>
-              <a:t> </a:t>
-            </a:r>
-            <a:endParaRPr lang="en-US" dirty="0"/>
-          </a:p>
-          <a:p>
-            <a:pPr lvl="1"/>
-            <a:r>
-              <a:rPr lang="en-US" dirty="0" smtClean="0"/>
-              <a:t>memory</a:t>
-            </a:r>
-            <a:r>
-              <a:rPr lang="en-US" dirty="0"/>
-              <a:t>: MSMC RAM / DDR3 </a:t>
-            </a:r>
-            <a:endParaRPr lang="en-US" dirty="0"/>
-          </a:p>
-          <a:p>
-            <a:pPr lvl="1"/>
-            <a:r>
-              <a:rPr lang="en-US" dirty="0" smtClean="0"/>
-              <a:t>alignment</a:t>
-            </a:r>
-            <a:r>
-              <a:rPr lang="en-US" dirty="0"/>
-              <a:t>: CACHE_L2_LINESIZE </a:t>
-            </a:r>
-            <a:endParaRPr lang="en-US" dirty="0"/>
-          </a:p>
-          <a:p>
-            <a:r>
-              <a:rPr lang="en-US" dirty="0" smtClean="0"/>
-              <a:t>.</a:t>
-            </a:r>
-            <a:r>
-              <a:rPr lang="en-US" dirty="0" err="1"/>
-              <a:t>tiEmGvLocalEventDscMem</a:t>
-            </a:r>
-            <a:r>
-              <a:rPr lang="en-US" dirty="0"/>
-              <a:t> </a:t>
-            </a:r>
-            <a:endParaRPr lang="en-US" dirty="0"/>
-          </a:p>
-          <a:p>
-            <a:pPr lvl="1"/>
-            <a:r>
-              <a:rPr lang="en-US" dirty="0" smtClean="0"/>
-              <a:t>memory</a:t>
-            </a:r>
-            <a:r>
-              <a:rPr lang="en-US" dirty="0"/>
-              <a:t>: </a:t>
-            </a:r>
-            <a:r>
-              <a:rPr lang="en-US" dirty="0" smtClean="0"/>
-              <a:t>L2SRAM</a:t>
-            </a:r>
-            <a:endParaRPr lang="en-US" dirty="0"/>
-          </a:p>
-          <a:p>
-            <a:pPr lvl="1"/>
-            <a:r>
-              <a:rPr lang="en-US" dirty="0" smtClean="0"/>
-              <a:t>alignment</a:t>
-            </a:r>
-            <a:r>
-              <a:rPr lang="en-US" dirty="0"/>
-              <a:t>: CACHE_L2_LINESIZE </a:t>
-            </a:r>
-            <a:endParaRPr lang="en-US" dirty="0"/>
+          <a:bodyPr/>
+          <a:lstStyle/>
+          <a:p>
+            <a:r>
+              <a:rPr lang="en-US" dirty="0" err="1" smtClean="0"/>
+              <a:t>OpenEM</a:t>
+            </a:r>
+            <a:r>
+              <a:rPr lang="en-US" dirty="0" smtClean="0"/>
+              <a:t> requires a set of memory areas to be created</a:t>
+            </a:r>
+          </a:p>
+          <a:p>
+            <a:r>
+              <a:rPr lang="en-US" dirty="0" smtClean="0"/>
+              <a:t>The TI </a:t>
+            </a:r>
+            <a:r>
+              <a:rPr lang="en-US" dirty="0" err="1" smtClean="0"/>
+              <a:t>OpenEM</a:t>
+            </a:r>
+            <a:r>
+              <a:rPr lang="en-US" dirty="0" smtClean="0"/>
+              <a:t> package contains a mapping that describes the memory areas required by </a:t>
+            </a:r>
+            <a:r>
+              <a:rPr lang="en-US" dirty="0" err="1" smtClean="0"/>
+              <a:t>OpenEM</a:t>
+            </a:r>
+            <a:endParaRPr lang="en-US" dirty="0" smtClean="0"/>
+          </a:p>
+          <a:p>
+            <a:pPr marL="0" indent="0">
+              <a:buNone/>
+            </a:pPr>
+            <a:endParaRPr lang="en-US" dirty="0" smtClean="0"/>
           </a:p>
           <a:p>
             <a:endParaRPr lang="en-US" dirty="0"/>
@@ -6246,7 +6524,7 @@
     </p:spTree>
     <p:extLst>
       <p:ext uri="{BB962C8B-B14F-4D97-AF65-F5344CB8AC3E}">
-        <p14:creationId xmlns:p14="http://schemas.microsoft.com/office/powerpoint/2010/main" val="2887038273"/>
+        <p14:creationId xmlns:p14="http://schemas.microsoft.com/office/powerpoint/2010/main" val="1001039881"/>
       </p:ext>
     </p:extLst>
   </p:cSld>
@@ -6289,9 +6567,10 @@
           <a:lstStyle/>
           <a:p>
             <a:r>
-              <a:rPr lang="en-US" dirty="0"/>
-              <a:t>Dynamic event allocation</a:t>
-            </a:r>
+              <a:rPr lang="en-US" dirty="0" smtClean="0"/>
+              <a:t>Memory areas 2/2</a:t>
+            </a:r>
+            <a:endParaRPr lang="en-US" dirty="0"/>
           </a:p>
         </p:txBody>
       </p:sp>
@@ -6307,56 +6586,46 @@
         </p:nvSpPr>
         <p:spPr/>
         <p:txBody>
-          <a:bodyPr/>
-          <a:lstStyle/>
-          <a:p>
-            <a:r>
-              <a:rPr lang="en-US" dirty="0" smtClean="0"/>
-              <a:t>Events </a:t>
-            </a:r>
-            <a:r>
-              <a:rPr lang="en-US" dirty="0"/>
-              <a:t>can be allocated at </a:t>
-            </a:r>
-            <a:r>
-              <a:rPr lang="en-US" dirty="0" smtClean="0"/>
-              <a:t>runtime</a:t>
-            </a:r>
-          </a:p>
-          <a:p>
-            <a:r>
-              <a:rPr lang="en-US" dirty="0" smtClean="0"/>
-              <a:t>Events </a:t>
-            </a:r>
-            <a:r>
-              <a:rPr lang="en-US" dirty="0"/>
-              <a:t>can contain the data to be processed or just pointer to the shared memory location of the data </a:t>
-            </a:r>
-            <a:r>
-              <a:rPr lang="en-US" dirty="0" smtClean="0"/>
-              <a:t>buffer</a:t>
-            </a:r>
-            <a:endParaRPr lang="en-US" dirty="0"/>
+          <a:bodyPr>
+            <a:normAutofit fontScale="92500" lnSpcReduction="10000"/>
+          </a:bodyPr>
+          <a:lstStyle/>
+          <a:p>
+            <a:r>
+              <a:rPr lang="en-US" dirty="0" smtClean="0"/>
+              <a:t>Specific memory regions are required for the QMSS, PKTDMA and EM libraries, the abstraction layer and the application</a:t>
+            </a:r>
+          </a:p>
+          <a:p>
+            <a:r>
+              <a:rPr lang="en-US" dirty="0" smtClean="0"/>
+              <a:t>The memory areas required by the libraries are predefined in a memory mapping provided in the example</a:t>
+            </a:r>
+          </a:p>
+          <a:p>
+            <a:r>
+              <a:rPr lang="en-US" dirty="0" smtClean="0"/>
+              <a:t>The abstraction layer defines the mappings for its own memory areas</a:t>
+            </a:r>
+          </a:p>
+          <a:p>
+            <a:r>
+              <a:rPr lang="en-US" dirty="0" smtClean="0"/>
+              <a:t>The user has to define memory sections for Public and Preload events buffers</a:t>
+            </a:r>
           </a:p>
         </p:txBody>
       </p:sp>
     </p:spTree>
     <p:extLst>
       <p:ext uri="{BB962C8B-B14F-4D97-AF65-F5344CB8AC3E}">
-        <p14:creationId xmlns:p14="http://schemas.microsoft.com/office/powerpoint/2010/main" val="252091811"/>
+        <p14:creationId xmlns:p14="http://schemas.microsoft.com/office/powerpoint/2010/main" val="2887038273"/>
       </p:ext>
     </p:extLst>
   </p:cSld>
   <p:clrMapOvr>
     <a:masterClrMapping/>
   </p:clrMapOvr>
-  <p:timing>
-    <p:tnLst>
-      <p:par>
-        <p:cTn xmlns:p14="http://schemas.microsoft.com/office/powerpoint/2010/main" id="1" dur="indefinite" restart="never" nodeType="tmRoot"/>
-      </p:par>
-    </p:tnLst>
-  </p:timing>
 </p:sld>
 </file>
 

</xml_diff>

<commit_message>
adds slide for Scheduling
</commit_message>
<xml_diff>
--- a/thesis_method.pptx
+++ b/thesis_method.pptx
@@ -5,7 +5,7 @@
     <p:sldMasterId id="2147483648" r:id="rId1"/>
   </p:sldMasterIdLst>
   <p:notesMasterIdLst>
-    <p:notesMasterId r:id="rId23"/>
+    <p:notesMasterId r:id="rId24"/>
   </p:notesMasterIdLst>
   <p:sldIdLst>
     <p:sldId id="256" r:id="rId2"/>
@@ -21,14 +21,15 @@
     <p:sldId id="275" r:id="rId12"/>
     <p:sldId id="276" r:id="rId13"/>
     <p:sldId id="277" r:id="rId14"/>
-    <p:sldId id="263" r:id="rId15"/>
-    <p:sldId id="261" r:id="rId16"/>
-    <p:sldId id="264" r:id="rId17"/>
-    <p:sldId id="266" r:id="rId18"/>
-    <p:sldId id="267" r:id="rId19"/>
-    <p:sldId id="272" r:id="rId20"/>
-    <p:sldId id="265" r:id="rId21"/>
-    <p:sldId id="268" r:id="rId22"/>
+    <p:sldId id="278" r:id="rId15"/>
+    <p:sldId id="263" r:id="rId16"/>
+    <p:sldId id="261" r:id="rId17"/>
+    <p:sldId id="264" r:id="rId18"/>
+    <p:sldId id="266" r:id="rId19"/>
+    <p:sldId id="267" r:id="rId20"/>
+    <p:sldId id="272" r:id="rId21"/>
+    <p:sldId id="265" r:id="rId22"/>
+    <p:sldId id="268" r:id="rId23"/>
   </p:sldIdLst>
   <p:sldSz cx="9144000" cy="6858000" type="screen4x3"/>
   <p:notesSz cx="6858000" cy="9144000"/>
@@ -145,6 +146,7 @@
             <p14:sldId id="275"/>
             <p14:sldId id="276"/>
             <p14:sldId id="277"/>
+            <p14:sldId id="278"/>
             <p14:sldId id="263"/>
             <p14:sldId id="261"/>
             <p14:sldId id="264"/>
@@ -243,7 +245,7 @@
           <a:p>
             <a:fld id="{198A1920-78C4-FD45-A7C5-EC9B47D9B1FE}" type="datetimeFigureOut">
               <a:rPr lang="en-US" smtClean="0"/>
-              <a:t>04/06/15</a:t>
+              <a:t>08/06/15</a:t>
             </a:fld>
             <a:endParaRPr lang="en-US"/>
           </a:p>
@@ -978,7 +980,7 @@
           <a:p>
             <a:fld id="{C599660D-8B38-4C41-A6B7-D7EED9039F0B}" type="slidenum">
               <a:rPr lang="en-US" smtClean="0"/>
-              <a:t>15</a:t>
+              <a:t>16</a:t>
             </a:fld>
             <a:endParaRPr lang="en-US"/>
           </a:p>
@@ -1074,7 +1076,7 @@
           <a:p>
             <a:fld id="{C599660D-8B38-4C41-A6B7-D7EED9039F0B}" type="slidenum">
               <a:rPr lang="en-US" smtClean="0"/>
-              <a:t>16</a:t>
+              <a:t>17</a:t>
             </a:fld>
             <a:endParaRPr lang="en-US"/>
           </a:p>
@@ -1274,7 +1276,7 @@
           <a:p>
             <a:fld id="{7631E370-FC6F-E046-9DC2-F257F601EE93}" type="datetimeFigureOut">
               <a:rPr lang="en-US" smtClean="0"/>
-              <a:t>04/06/15</a:t>
+              <a:t>08/06/15</a:t>
             </a:fld>
             <a:endParaRPr lang="en-US"/>
           </a:p>
@@ -1444,7 +1446,7 @@
           <a:p>
             <a:fld id="{7631E370-FC6F-E046-9DC2-F257F601EE93}" type="datetimeFigureOut">
               <a:rPr lang="en-US" smtClean="0"/>
-              <a:t>04/06/15</a:t>
+              <a:t>08/06/15</a:t>
             </a:fld>
             <a:endParaRPr lang="en-US"/>
           </a:p>
@@ -1624,7 +1626,7 @@
           <a:p>
             <a:fld id="{7631E370-FC6F-E046-9DC2-F257F601EE93}" type="datetimeFigureOut">
               <a:rPr lang="en-US" smtClean="0"/>
-              <a:t>04/06/15</a:t>
+              <a:t>08/06/15</a:t>
             </a:fld>
             <a:endParaRPr lang="en-US"/>
           </a:p>
@@ -1794,7 +1796,7 @@
           <a:p>
             <a:fld id="{7631E370-FC6F-E046-9DC2-F257F601EE93}" type="datetimeFigureOut">
               <a:rPr lang="en-US" smtClean="0"/>
-              <a:t>04/06/15</a:t>
+              <a:t>08/06/15</a:t>
             </a:fld>
             <a:endParaRPr lang="en-US"/>
           </a:p>
@@ -2040,7 +2042,7 @@
           <a:p>
             <a:fld id="{7631E370-FC6F-E046-9DC2-F257F601EE93}" type="datetimeFigureOut">
               <a:rPr lang="en-US" smtClean="0"/>
-              <a:t>04/06/15</a:t>
+              <a:t>08/06/15</a:t>
             </a:fld>
             <a:endParaRPr lang="en-US"/>
           </a:p>
@@ -2328,7 +2330,7 @@
           <a:p>
             <a:fld id="{7631E370-FC6F-E046-9DC2-F257F601EE93}" type="datetimeFigureOut">
               <a:rPr lang="en-US" smtClean="0"/>
-              <a:t>04/06/15</a:t>
+              <a:t>08/06/15</a:t>
             </a:fld>
             <a:endParaRPr lang="en-US"/>
           </a:p>
@@ -2750,7 +2752,7 @@
           <a:p>
             <a:fld id="{7631E370-FC6F-E046-9DC2-F257F601EE93}" type="datetimeFigureOut">
               <a:rPr lang="en-US" smtClean="0"/>
-              <a:t>04/06/15</a:t>
+              <a:t>08/06/15</a:t>
             </a:fld>
             <a:endParaRPr lang="en-US"/>
           </a:p>
@@ -2868,7 +2870,7 @@
           <a:p>
             <a:fld id="{7631E370-FC6F-E046-9DC2-F257F601EE93}" type="datetimeFigureOut">
               <a:rPr lang="en-US" smtClean="0"/>
-              <a:t>04/06/15</a:t>
+              <a:t>08/06/15</a:t>
             </a:fld>
             <a:endParaRPr lang="en-US"/>
           </a:p>
@@ -2963,7 +2965,7 @@
           <a:p>
             <a:fld id="{7631E370-FC6F-E046-9DC2-F257F601EE93}" type="datetimeFigureOut">
               <a:rPr lang="en-US" smtClean="0"/>
-              <a:t>04/06/15</a:t>
+              <a:t>08/06/15</a:t>
             </a:fld>
             <a:endParaRPr lang="en-US"/>
           </a:p>
@@ -3240,7 +3242,7 @@
           <a:p>
             <a:fld id="{7631E370-FC6F-E046-9DC2-F257F601EE93}" type="datetimeFigureOut">
               <a:rPr lang="en-US" smtClean="0"/>
-              <a:t>04/06/15</a:t>
+              <a:t>08/06/15</a:t>
             </a:fld>
             <a:endParaRPr lang="en-US"/>
           </a:p>
@@ -3493,7 +3495,7 @@
           <a:p>
             <a:fld id="{7631E370-FC6F-E046-9DC2-F257F601EE93}" type="datetimeFigureOut">
               <a:rPr lang="en-US" smtClean="0"/>
-              <a:t>04/06/15</a:t>
+              <a:t>08/06/15</a:t>
             </a:fld>
             <a:endParaRPr lang="en-US"/>
           </a:p>
@@ -3706,7 +3708,7 @@
           <a:p>
             <a:fld id="{7631E370-FC6F-E046-9DC2-F257F601EE93}" type="datetimeFigureOut">
               <a:rPr lang="en-US" smtClean="0"/>
-              <a:t>04/06/15</a:t>
+              <a:t>08/06/15</a:t>
             </a:fld>
             <a:endParaRPr lang="en-US"/>
           </a:p>
@@ -4572,6 +4574,130 @@
       </p:grpSpPr>
       <p:sp>
         <p:nvSpPr>
+          <p:cNvPr id="2" name="Title 1"/>
+          <p:cNvSpPr>
+            <a:spLocks noGrp="1"/>
+          </p:cNvSpPr>
+          <p:nvPr>
+            <p:ph type="title"/>
+          </p:nvPr>
+        </p:nvSpPr>
+        <p:spPr/>
+        <p:txBody>
+          <a:bodyPr/>
+          <a:lstStyle/>
+          <a:p>
+            <a:r>
+              <a:rPr lang="en-US" dirty="0" smtClean="0"/>
+              <a:t>Scheduling</a:t>
+            </a:r>
+            <a:endParaRPr lang="en-US" dirty="0"/>
+          </a:p>
+        </p:txBody>
+      </p:sp>
+      <p:sp>
+        <p:nvSpPr>
+          <p:cNvPr id="3" name="Content Placeholder 2"/>
+          <p:cNvSpPr>
+            <a:spLocks noGrp="1"/>
+          </p:cNvSpPr>
+          <p:nvPr>
+            <p:ph idx="1"/>
+          </p:nvPr>
+        </p:nvSpPr>
+        <p:spPr/>
+        <p:txBody>
+          <a:bodyPr>
+            <a:normAutofit fontScale="92500"/>
+          </a:bodyPr>
+          <a:lstStyle/>
+          <a:p>
+            <a:r>
+              <a:rPr lang="en-US" dirty="0" smtClean="0"/>
+              <a:t>All objects shared among all cores</a:t>
+            </a:r>
+          </a:p>
+          <a:p>
+            <a:r>
+              <a:rPr lang="en-US" dirty="0" smtClean="0"/>
+              <a:t>Queues belong to Queue Groups that can have core masks attached to them</a:t>
+            </a:r>
+          </a:p>
+          <a:p>
+            <a:r>
+              <a:rPr lang="en-US" dirty="0" smtClean="0"/>
+              <a:t>Events will be scheduled on all cores in the queue group according to four queue selection criteria</a:t>
+            </a:r>
+          </a:p>
+          <a:p>
+            <a:pPr lvl="1"/>
+            <a:r>
+              <a:rPr lang="en-US" dirty="0" smtClean="0"/>
+              <a:t>Priority</a:t>
+            </a:r>
+          </a:p>
+          <a:p>
+            <a:pPr lvl="1"/>
+            <a:r>
+              <a:rPr lang="en-US" dirty="0" smtClean="0"/>
+              <a:t>Atomicity</a:t>
+            </a:r>
+          </a:p>
+          <a:p>
+            <a:pPr lvl="1"/>
+            <a:r>
+              <a:rPr lang="en-US" dirty="0" smtClean="0"/>
+              <a:t>Locality </a:t>
+            </a:r>
+          </a:p>
+          <a:p>
+            <a:pPr lvl="1"/>
+            <a:r>
+              <a:rPr lang="en-US" dirty="0" smtClean="0"/>
+              <a:t>Order </a:t>
+            </a:r>
+            <a:endParaRPr lang="en-US" dirty="0"/>
+          </a:p>
+          <a:p>
+            <a:pPr marL="457200" lvl="1" indent="0">
+              <a:buNone/>
+            </a:pPr>
+            <a:endParaRPr lang="en-US" dirty="0" smtClean="0"/>
+          </a:p>
+        </p:txBody>
+      </p:sp>
+    </p:spTree>
+    <p:extLst>
+      <p:ext uri="{BB962C8B-B14F-4D97-AF65-F5344CB8AC3E}">
+        <p14:creationId xmlns:p14="http://schemas.microsoft.com/office/powerpoint/2010/main" val="4130856862"/>
+      </p:ext>
+    </p:extLst>
+  </p:cSld>
+  <p:clrMapOvr>
+    <a:masterClrMapping/>
+  </p:clrMapOvr>
+</p:sld>
+</file>
+
+<file path=ppt/slides/slide15.xml><?xml version="1.0" encoding="utf-8"?>
+<p:sld xmlns:a="http://schemas.openxmlformats.org/drawingml/2006/main" xmlns:r="http://schemas.openxmlformats.org/officeDocument/2006/relationships" xmlns:p="http://schemas.openxmlformats.org/presentationml/2006/main">
+  <p:cSld>
+    <p:spTree>
+      <p:nvGrpSpPr>
+        <p:cNvPr id="1" name=""/>
+        <p:cNvGrpSpPr/>
+        <p:nvPr/>
+      </p:nvGrpSpPr>
+      <p:grpSpPr>
+        <a:xfrm>
+          <a:off x="0" y="0"/>
+          <a:ext cx="0" cy="0"/>
+          <a:chOff x="0" y="0"/>
+          <a:chExt cx="0" cy="0"/>
+        </a:xfrm>
+      </p:grpSpPr>
+      <p:sp>
+        <p:nvSpPr>
           <p:cNvPr id="6" name="Title 5"/>
           <p:cNvSpPr>
             <a:spLocks noGrp="1"/>
@@ -4642,206 +4768,6 @@
 </p:sld>
 </file>
 
-<file path=ppt/slides/slide15.xml><?xml version="1.0" encoding="utf-8"?>
-<p:sld xmlns:a="http://schemas.openxmlformats.org/drawingml/2006/main" xmlns:r="http://schemas.openxmlformats.org/officeDocument/2006/relationships" xmlns:p="http://schemas.openxmlformats.org/presentationml/2006/main">
-  <p:cSld>
-    <p:spTree>
-      <p:nvGrpSpPr>
-        <p:cNvPr id="1" name=""/>
-        <p:cNvGrpSpPr/>
-        <p:nvPr/>
-      </p:nvGrpSpPr>
-      <p:grpSpPr>
-        <a:xfrm>
-          <a:off x="0" y="0"/>
-          <a:ext cx="0" cy="0"/>
-          <a:chOff x="0" y="0"/>
-          <a:chExt cx="0" cy="0"/>
-        </a:xfrm>
-      </p:grpSpPr>
-      <p:sp>
-        <p:nvSpPr>
-          <p:cNvPr id="2" name="Title 1"/>
-          <p:cNvSpPr>
-            <a:spLocks noGrp="1"/>
-          </p:cNvSpPr>
-          <p:nvPr>
-            <p:ph type="title"/>
-          </p:nvPr>
-        </p:nvSpPr>
-        <p:spPr/>
-        <p:txBody>
-          <a:bodyPr/>
-          <a:lstStyle/>
-          <a:p>
-            <a:r>
-              <a:rPr lang="en-US" dirty="0" smtClean="0"/>
-              <a:t>PREESM Generated Code for TI	</a:t>
-            </a:r>
-            <a:endParaRPr lang="en-US" dirty="0"/>
-          </a:p>
-        </p:txBody>
-      </p:sp>
-      <p:sp>
-        <p:nvSpPr>
-          <p:cNvPr id="3" name="Content Placeholder 2"/>
-          <p:cNvSpPr>
-            <a:spLocks noGrp="1"/>
-          </p:cNvSpPr>
-          <p:nvPr>
-            <p:ph idx="1"/>
-          </p:nvPr>
-        </p:nvSpPr>
-        <p:spPr/>
-        <p:txBody>
-          <a:bodyPr>
-            <a:normAutofit fontScale="85000" lnSpcReduction="10000"/>
-          </a:bodyPr>
-          <a:lstStyle/>
-          <a:p>
-            <a:r>
-              <a:rPr lang="en-US" dirty="0" smtClean="0"/>
-              <a:t>PREESM is capable of generating code from the actor model program defined using graphical tools for C6678</a:t>
-            </a:r>
-          </a:p>
-          <a:p>
-            <a:pPr lvl="1"/>
-            <a:r>
-              <a:rPr lang="en-US" dirty="0" smtClean="0"/>
-              <a:t>Eclipse LUNA needed for graphical tools</a:t>
-            </a:r>
-          </a:p>
-          <a:p>
-            <a:r>
-              <a:rPr lang="en-US" dirty="0" smtClean="0"/>
-              <a:t>The generated code requires a custom target platform in CCS which alters the default memory layout</a:t>
-            </a:r>
-          </a:p>
-          <a:p>
-            <a:pPr lvl="1"/>
-            <a:r>
-              <a:rPr lang="en-US" dirty="0" smtClean="0"/>
-              <a:t>5.3 &gt; CCS Version &gt; 5.2 required</a:t>
-            </a:r>
-          </a:p>
-          <a:p>
-            <a:r>
-              <a:rPr lang="en-US" dirty="0" smtClean="0"/>
-              <a:t>Requires sys/bios and </a:t>
-            </a:r>
-            <a:r>
-              <a:rPr lang="en-US" dirty="0" err="1" smtClean="0"/>
-              <a:t>ipc</a:t>
-            </a:r>
-            <a:endParaRPr lang="en-US" dirty="0" smtClean="0"/>
-          </a:p>
-          <a:p>
-            <a:pPr lvl="1"/>
-            <a:r>
-              <a:rPr lang="en-US" dirty="0" smtClean="0"/>
-              <a:t>BIOS MCSDK 2.x</a:t>
-            </a:r>
-          </a:p>
-          <a:p>
-            <a:pPr lvl="1"/>
-            <a:r>
-              <a:rPr lang="en-US" dirty="0" smtClean="0"/>
-              <a:t>&lt;</a:t>
-            </a:r>
-            <a:r>
-              <a:rPr lang="en-US" dirty="0" err="1" smtClean="0"/>
-              <a:t>ti</a:t>
-            </a:r>
-            <a:r>
-              <a:rPr lang="en-US" dirty="0" smtClean="0"/>
-              <a:t>/</a:t>
-            </a:r>
-            <a:r>
-              <a:rPr lang="en-US" dirty="0" err="1" smtClean="0"/>
-              <a:t>ipc</a:t>
-            </a:r>
-            <a:r>
-              <a:rPr lang="en-US" dirty="0" smtClean="0"/>
-              <a:t>/</a:t>
-            </a:r>
-            <a:r>
-              <a:rPr lang="en-US" dirty="0" err="1" smtClean="0"/>
-              <a:t>Ipc.h</a:t>
-            </a:r>
-            <a:r>
-              <a:rPr lang="en-US" dirty="0" smtClean="0"/>
-              <a:t>&gt;</a:t>
-            </a:r>
-          </a:p>
-          <a:p>
-            <a:pPr lvl="1"/>
-            <a:r>
-              <a:rPr lang="en-US" dirty="0" smtClean="0"/>
-              <a:t>&lt;</a:t>
-            </a:r>
-            <a:r>
-              <a:rPr lang="en-US" dirty="0" err="1" smtClean="0"/>
-              <a:t>ti</a:t>
-            </a:r>
-            <a:r>
-              <a:rPr lang="en-US" dirty="0" smtClean="0"/>
-              <a:t>/</a:t>
-            </a:r>
-            <a:r>
-              <a:rPr lang="en-US" dirty="0" err="1" smtClean="0"/>
-              <a:t>sysbios</a:t>
-            </a:r>
-            <a:r>
-              <a:rPr lang="en-US" dirty="0" smtClean="0"/>
-              <a:t>/</a:t>
-            </a:r>
-            <a:r>
-              <a:rPr lang="en-US" dirty="0" err="1" smtClean="0"/>
-              <a:t>knl</a:t>
-            </a:r>
-            <a:r>
-              <a:rPr lang="en-US" dirty="0" smtClean="0"/>
-              <a:t>/</a:t>
-            </a:r>
-            <a:r>
-              <a:rPr lang="en-US" dirty="0" err="1" smtClean="0"/>
-              <a:t>Semaphore.h</a:t>
-            </a:r>
-            <a:r>
-              <a:rPr lang="en-US" dirty="0" smtClean="0"/>
-              <a:t>&gt;</a:t>
-            </a:r>
-          </a:p>
-          <a:p>
-            <a:pPr lvl="1"/>
-            <a:r>
-              <a:rPr lang="en-US" dirty="0" err="1" smtClean="0"/>
-              <a:t>etc</a:t>
-            </a:r>
-            <a:endParaRPr lang="en-US" dirty="0"/>
-          </a:p>
-        </p:txBody>
-      </p:sp>
-    </p:spTree>
-    <p:extLst>
-      <p:ext uri="{BB962C8B-B14F-4D97-AF65-F5344CB8AC3E}">
-        <p14:creationId xmlns:p14="http://schemas.microsoft.com/office/powerpoint/2010/main" val="1240314304"/>
-      </p:ext>
-    </p:extLst>
-  </p:cSld>
-  <p:clrMapOvr>
-    <a:masterClrMapping/>
-  </p:clrMapOvr>
-  <p:timing>
-    <p:tnLst>
-      <p:par>
-        <p:cTn xmlns:p14="http://schemas.microsoft.com/office/powerpoint/2010/main" id="1" dur="indefinite" restart="never" nodeType="tmRoot"/>
-      </p:par>
-    </p:tnLst>
-  </p:timing>
-</p:sld>
-</file>
-
 <file path=ppt/slides/slide16.xml><?xml version="1.0" encoding="utf-8"?>
 <p:sld xmlns:a="http://schemas.openxmlformats.org/drawingml/2006/main" xmlns:r="http://schemas.openxmlformats.org/officeDocument/2006/relationships" xmlns:p="http://schemas.openxmlformats.org/presentationml/2006/main">
   <p:cSld>
@@ -4876,7 +4802,7 @@
           <a:p>
             <a:r>
               <a:rPr lang="en-US" dirty="0" smtClean="0"/>
-              <a:t>Thesis experiment</a:t>
+              <a:t>PREESM Generated Code for TI	</a:t>
             </a:r>
             <a:endParaRPr lang="en-US" dirty="0"/>
           </a:p>
@@ -4895,52 +4821,137 @@
         <p:spPr/>
         <p:txBody>
           <a:bodyPr>
-            <a:normAutofit/>
+            <a:normAutofit fontScale="85000" lnSpcReduction="10000"/>
           </a:bodyPr>
           <a:lstStyle/>
           <a:p>
             <a:r>
               <a:rPr lang="en-US" dirty="0" smtClean="0"/>
-              <a:t>Video filtering application with PREESM</a:t>
-            </a:r>
-          </a:p>
-          <a:p>
-            <a:r>
-              <a:rPr lang="en-US" dirty="0" smtClean="0"/>
-              <a:t>Convert the PREESM application to </a:t>
+              <a:t>PREESM is capable of generating code from the actor model program defined using graphical tools for C6678</a:t>
+            </a:r>
+          </a:p>
+          <a:p>
+            <a:pPr lvl="1"/>
+            <a:r>
+              <a:rPr lang="en-US" dirty="0" smtClean="0"/>
+              <a:t>Eclipse LUNA needed for graphical tools</a:t>
+            </a:r>
+          </a:p>
+          <a:p>
+            <a:r>
+              <a:rPr lang="en-US" dirty="0" smtClean="0"/>
+              <a:t>The generated code requires a custom target platform in CCS which alters the default memory layout</a:t>
+            </a:r>
+          </a:p>
+          <a:p>
+            <a:pPr lvl="1"/>
+            <a:r>
+              <a:rPr lang="en-US" dirty="0" smtClean="0"/>
+              <a:t>5.3 &gt; CCS Version &gt; 5.2 required</a:t>
+            </a:r>
+          </a:p>
+          <a:p>
+            <a:r>
+              <a:rPr lang="en-US" dirty="0" smtClean="0"/>
+              <a:t>Requires sys/bios and </a:t>
             </a:r>
             <a:r>
               <a:rPr lang="en-US" dirty="0" err="1" smtClean="0"/>
-              <a:t>OpenEM</a:t>
+              <a:t>ipc</a:t>
             </a:r>
             <a:endParaRPr lang="en-US" dirty="0" smtClean="0"/>
           </a:p>
           <a:p>
-            <a:r>
-              <a:rPr lang="en-US" dirty="0" smtClean="0"/>
-              <a:t>Analyze both applications</a:t>
-            </a:r>
-          </a:p>
-          <a:p>
             <a:pPr lvl="1"/>
             <a:r>
               <a:rPr lang="en-US" dirty="0" smtClean="0"/>
-              <a:t>Static analysis</a:t>
+              <a:t>BIOS MCSDK 2.x</a:t>
             </a:r>
           </a:p>
           <a:p>
             <a:pPr lvl="1"/>
             <a:r>
               <a:rPr lang="en-US" dirty="0" smtClean="0"/>
-              <a:t>Dynamic analysis</a:t>
-            </a:r>
+              <a:t>&lt;</a:t>
+            </a:r>
+            <a:r>
+              <a:rPr lang="en-US" dirty="0" err="1" smtClean="0"/>
+              <a:t>ti</a:t>
+            </a:r>
+            <a:r>
+              <a:rPr lang="en-US" dirty="0" smtClean="0"/>
+              <a:t>/</a:t>
+            </a:r>
+            <a:r>
+              <a:rPr lang="en-US" dirty="0" err="1" smtClean="0"/>
+              <a:t>ipc</a:t>
+            </a:r>
+            <a:r>
+              <a:rPr lang="en-US" dirty="0" smtClean="0"/>
+              <a:t>/</a:t>
+            </a:r>
+            <a:r>
+              <a:rPr lang="en-US" dirty="0" err="1" smtClean="0"/>
+              <a:t>Ipc.h</a:t>
+            </a:r>
+            <a:r>
+              <a:rPr lang="en-US" dirty="0" smtClean="0"/>
+              <a:t>&gt;</a:t>
+            </a:r>
+          </a:p>
+          <a:p>
+            <a:pPr lvl="1"/>
+            <a:r>
+              <a:rPr lang="en-US" dirty="0" smtClean="0"/>
+              <a:t>&lt;</a:t>
+            </a:r>
+            <a:r>
+              <a:rPr lang="en-US" dirty="0" err="1" smtClean="0"/>
+              <a:t>ti</a:t>
+            </a:r>
+            <a:r>
+              <a:rPr lang="en-US" dirty="0" smtClean="0"/>
+              <a:t>/</a:t>
+            </a:r>
+            <a:r>
+              <a:rPr lang="en-US" dirty="0" err="1" smtClean="0"/>
+              <a:t>sysbios</a:t>
+            </a:r>
+            <a:r>
+              <a:rPr lang="en-US" dirty="0" smtClean="0"/>
+              <a:t>/</a:t>
+            </a:r>
+            <a:r>
+              <a:rPr lang="en-US" dirty="0" err="1" smtClean="0"/>
+              <a:t>knl</a:t>
+            </a:r>
+            <a:r>
+              <a:rPr lang="en-US" dirty="0" smtClean="0"/>
+              <a:t>/</a:t>
+            </a:r>
+            <a:r>
+              <a:rPr lang="en-US" dirty="0" err="1" smtClean="0"/>
+              <a:t>Semaphore.h</a:t>
+            </a:r>
+            <a:r>
+              <a:rPr lang="en-US" dirty="0" smtClean="0"/>
+              <a:t>&gt;</a:t>
+            </a:r>
+          </a:p>
+          <a:p>
+            <a:pPr lvl="1"/>
+            <a:r>
+              <a:rPr lang="en-US" dirty="0" err="1" smtClean="0"/>
+              <a:t>etc</a:t>
+            </a:r>
+            <a:endParaRPr lang="en-US" dirty="0"/>
           </a:p>
         </p:txBody>
       </p:sp>
     </p:spTree>
     <p:extLst>
       <p:ext uri="{BB962C8B-B14F-4D97-AF65-F5344CB8AC3E}">
-        <p14:creationId xmlns:p14="http://schemas.microsoft.com/office/powerpoint/2010/main" val="1052199147"/>
+        <p14:creationId xmlns:p14="http://schemas.microsoft.com/office/powerpoint/2010/main" val="1240314304"/>
       </p:ext>
     </p:extLst>
   </p:cSld>
@@ -4986,71 +4997,76 @@
         </p:nvSpPr>
         <p:spPr/>
         <p:txBody>
+          <a:bodyPr/>
+          <a:lstStyle/>
+          <a:p>
+            <a:r>
+              <a:rPr lang="en-US" dirty="0" smtClean="0"/>
+              <a:t>Thesis experiment</a:t>
+            </a:r>
+            <a:endParaRPr lang="en-US" dirty="0"/>
+          </a:p>
+        </p:txBody>
+      </p:sp>
+      <p:sp>
+        <p:nvSpPr>
+          <p:cNvPr id="3" name="Content Placeholder 2"/>
+          <p:cNvSpPr>
+            <a:spLocks noGrp="1"/>
+          </p:cNvSpPr>
+          <p:nvPr>
+            <p:ph idx="1"/>
+          </p:nvPr>
+        </p:nvSpPr>
+        <p:spPr/>
+        <p:txBody>
           <a:bodyPr>
-            <a:normAutofit fontScale="90000"/>
+            <a:normAutofit/>
           </a:bodyPr>
           <a:lstStyle/>
           <a:p>
             <a:r>
               <a:rPr lang="en-US" dirty="0" smtClean="0"/>
-              <a:t>Video Filter Application using PREESM</a:t>
-            </a:r>
-            <a:endParaRPr lang="en-US" dirty="0"/>
-          </a:p>
-        </p:txBody>
-      </p:sp>
-      <p:sp>
-        <p:nvSpPr>
-          <p:cNvPr id="3" name="Content Placeholder 2"/>
-          <p:cNvSpPr>
-            <a:spLocks noGrp="1"/>
-          </p:cNvSpPr>
-          <p:nvPr>
-            <p:ph idx="1"/>
-          </p:nvPr>
-        </p:nvSpPr>
-        <p:spPr/>
-        <p:txBody>
-          <a:bodyPr/>
-          <a:lstStyle/>
-          <a:p>
-            <a:r>
-              <a:rPr lang="en-US" dirty="0"/>
-              <a:t>Multiple input video streams</a:t>
-            </a:r>
-          </a:p>
-          <a:p>
-            <a:r>
-              <a:rPr lang="en-US" dirty="0" err="1"/>
-              <a:t>Sobel</a:t>
-            </a:r>
-            <a:r>
-              <a:rPr lang="en-US" dirty="0"/>
-              <a:t> &amp; Gaussian filters capable of processing the same stream on multiple cores</a:t>
-            </a:r>
-          </a:p>
-          <a:p>
-            <a:r>
-              <a:rPr lang="en-US" dirty="0"/>
-              <a:t>Manually scheduled</a:t>
+              <a:t>Video filtering application with PREESM</a:t>
+            </a:r>
+          </a:p>
+          <a:p>
+            <a:r>
+              <a:rPr lang="en-US" dirty="0" smtClean="0"/>
+              <a:t>Convert the PREESM application to </a:t>
+            </a:r>
+            <a:r>
+              <a:rPr lang="en-US" dirty="0" err="1" smtClean="0"/>
+              <a:t>OpenEM</a:t>
+            </a:r>
+            <a:endParaRPr lang="en-US" dirty="0" smtClean="0"/>
+          </a:p>
+          <a:p>
+            <a:r>
+              <a:rPr lang="en-US" dirty="0" smtClean="0"/>
+              <a:t>Analyze both applications</a:t>
             </a:r>
           </a:p>
           <a:p>
             <a:pPr lvl="1"/>
             <a:r>
-              <a:rPr lang="en-US" dirty="0"/>
-              <a:t>Actors divided between cores depending on the number of input streams</a:t>
-            </a:r>
-          </a:p>
-          <a:p>
-            <a:endParaRPr lang="en-US" dirty="0"/>
+              <a:rPr lang="en-US" dirty="0" smtClean="0"/>
+              <a:t>Static analysis</a:t>
+            </a:r>
+          </a:p>
+          <a:p>
+            <a:pPr lvl="1"/>
+            <a:r>
+              <a:rPr lang="en-US" dirty="0" smtClean="0"/>
+              <a:t>Dynamic analysis</a:t>
+            </a:r>
           </a:p>
         </p:txBody>
       </p:sp>
     </p:spTree>
     <p:extLst>
       <p:ext uri="{BB962C8B-B14F-4D97-AF65-F5344CB8AC3E}">
-        <p14:creationId xmlns:p14="http://schemas.microsoft.com/office/powerpoint/2010/main" val="2838267606"/>
+        <p14:creationId xmlns:p14="http://schemas.microsoft.com/office/powerpoint/2010/main" val="1052199147"/>
       </p:ext>
     </p:extLst>
   </p:cSld>
@@ -5096,16 +5112,14 @@
         </p:nvSpPr>
         <p:spPr/>
         <p:txBody>
-          <a:bodyPr/>
-          <a:lstStyle/>
-          <a:p>
-            <a:r>
-              <a:rPr lang="en-US" dirty="0" smtClean="0"/>
-              <a:t>Actors in </a:t>
-            </a:r>
-            <a:r>
-              <a:rPr lang="en-US" dirty="0" err="1" smtClean="0"/>
-              <a:t>OpenEM</a:t>
+          <a:bodyPr>
+            <a:normAutofit fontScale="90000"/>
+          </a:bodyPr>
+          <a:lstStyle/>
+          <a:p>
+            <a:r>
+              <a:rPr lang="en-US" dirty="0" smtClean="0"/>
+              <a:t>Video Filter Application using PREESM</a:t>
             </a:r>
             <a:endParaRPr lang="en-US" dirty="0"/>
           </a:p>
@@ -5127,22 +5141,42 @@
           <a:lstStyle/>
           <a:p>
             <a:r>
-              <a:rPr lang="en-US" dirty="0" smtClean="0"/>
-              <a:t>Map Actors to Execution Objects</a:t>
-            </a:r>
-          </a:p>
-          <a:p>
-            <a:r>
-              <a:rPr lang="en-US" dirty="0" smtClean="0"/>
-              <a:t>PREESM Actor model guarantees memory independency between Actors and the data is moved in static size units</a:t>
-            </a:r>
+              <a:rPr lang="en-US" dirty="0"/>
+              <a:t>Multiple input video streams</a:t>
+            </a:r>
+          </a:p>
+          <a:p>
+            <a:r>
+              <a:rPr lang="en-US" dirty="0" err="1"/>
+              <a:t>Sobel</a:t>
+            </a:r>
+            <a:r>
+              <a:rPr lang="en-US" dirty="0"/>
+              <a:t> &amp; Gaussian filters capable of processing the same stream on multiple cores</a:t>
+            </a:r>
+          </a:p>
+          <a:p>
+            <a:r>
+              <a:rPr lang="en-US" dirty="0"/>
+              <a:t>Manually scheduled</a:t>
+            </a:r>
+          </a:p>
+          <a:p>
+            <a:pPr lvl="1"/>
+            <a:r>
+              <a:rPr lang="en-US" dirty="0"/>
+              <a:t>Actors divided between cores depending on the number of input streams</a:t>
+            </a:r>
+          </a:p>
+          <a:p>
+            <a:endParaRPr lang="en-US" dirty="0"/>
           </a:p>
         </p:txBody>
       </p:sp>
     </p:spTree>
     <p:extLst>
       <p:ext uri="{BB962C8B-B14F-4D97-AF65-F5344CB8AC3E}">
-        <p14:creationId xmlns:p14="http://schemas.microsoft.com/office/powerpoint/2010/main" val="1538209171"/>
+        <p14:creationId xmlns:p14="http://schemas.microsoft.com/office/powerpoint/2010/main" val="2838267606"/>
       </p:ext>
     </p:extLst>
   </p:cSld>
@@ -5188,14 +5222,12 @@
         </p:nvSpPr>
         <p:spPr/>
         <p:txBody>
-          <a:bodyPr>
-            <a:normAutofit fontScale="90000"/>
-          </a:bodyPr>
-          <a:lstStyle/>
-          <a:p>
-            <a:r>
-              <a:rPr lang="en-US" dirty="0" smtClean="0"/>
-              <a:t>Implementing the experiment with </a:t>
+          <a:bodyPr/>
+          <a:lstStyle/>
+          <a:p>
+            <a:r>
+              <a:rPr lang="en-US" dirty="0" smtClean="0"/>
+              <a:t>Actors in </a:t>
             </a:r>
             <a:r>
               <a:rPr lang="en-US" dirty="0" err="1" smtClean="0"/>
@@ -5217,108 +5249,26 @@
         </p:nvSpPr>
         <p:spPr/>
         <p:txBody>
-          <a:bodyPr>
-            <a:normAutofit fontScale="85000" lnSpcReduction="20000"/>
-          </a:bodyPr>
-          <a:lstStyle/>
-          <a:p>
-            <a:r>
-              <a:rPr lang="en-US" dirty="0" smtClean="0"/>
-              <a:t>Input</a:t>
-            </a:r>
-          </a:p>
-          <a:p>
-            <a:pPr lvl="1"/>
-            <a:r>
-              <a:rPr lang="en-US" dirty="0" smtClean="0"/>
-              <a:t>Data preloaded in to memory</a:t>
-            </a:r>
-          </a:p>
-          <a:p>
-            <a:pPr lvl="1"/>
-            <a:r>
-              <a:rPr lang="en-US" dirty="0" smtClean="0"/>
-              <a:t>A regular for loop </a:t>
-            </a:r>
-            <a:r>
-              <a:rPr lang="en-US" dirty="0" err="1" smtClean="0"/>
-              <a:t>em_allocing</a:t>
-            </a:r>
-            <a:r>
-              <a:rPr lang="en-US" dirty="0" smtClean="0"/>
-              <a:t> events outside the </a:t>
-            </a:r>
-            <a:r>
-              <a:rPr lang="en-US" dirty="0" err="1" smtClean="0"/>
-              <a:t>OpenEM</a:t>
-            </a:r>
-            <a:r>
-              <a:rPr lang="en-US" dirty="0" smtClean="0"/>
-              <a:t> operating context</a:t>
-            </a:r>
-          </a:p>
-          <a:p>
-            <a:pPr lvl="1"/>
-            <a:r>
-              <a:rPr lang="en-US" dirty="0" smtClean="0"/>
-              <a:t>Low priority Queue for input events that </a:t>
-            </a:r>
-            <a:r>
-              <a:rPr lang="en-US" dirty="0" err="1" smtClean="0"/>
-              <a:t>em_alloc</a:t>
-            </a:r>
-            <a:r>
-              <a:rPr lang="en-US" dirty="0" smtClean="0"/>
-              <a:t> actual data events and new input events</a:t>
-            </a:r>
-          </a:p>
-          <a:p>
-            <a:r>
-              <a:rPr lang="en-US" dirty="0" smtClean="0"/>
-              <a:t>Output</a:t>
-            </a:r>
-          </a:p>
-          <a:p>
-            <a:pPr lvl="1"/>
-            <a:r>
-              <a:rPr lang="en-US" dirty="0" smtClean="0"/>
-              <a:t>Low priority queues which collect events holding the results that are allocated by the actual filter EO</a:t>
-            </a:r>
-          </a:p>
-          <a:p>
-            <a:pPr lvl="1"/>
-            <a:r>
-              <a:rPr lang="en-US" dirty="0" smtClean="0"/>
-              <a:t>Collect statistics and free events</a:t>
-            </a:r>
-          </a:p>
-          <a:p>
-            <a:r>
-              <a:rPr lang="en-US" dirty="0" smtClean="0"/>
-              <a:t>Processing</a:t>
-            </a:r>
-          </a:p>
-          <a:p>
-            <a:pPr lvl="1"/>
-            <a:r>
-              <a:rPr lang="en-US" dirty="0" smtClean="0"/>
-              <a:t>Filters implemented as Execution objects</a:t>
-            </a:r>
-          </a:p>
-          <a:p>
-            <a:pPr lvl="1"/>
-            <a:endParaRPr lang="en-US" dirty="0" smtClean="0"/>
-          </a:p>
-          <a:p>
-            <a:pPr lvl="1"/>
-            <a:endParaRPr lang="en-US" dirty="0" smtClean="0"/>
+          <a:bodyPr/>
+          <a:lstStyle/>
+          <a:p>
+            <a:r>
+              <a:rPr lang="en-US" dirty="0" smtClean="0"/>
+              <a:t>Map Actors to Execution Objects</a:t>
+            </a:r>
+          </a:p>
+          <a:p>
+            <a:r>
+              <a:rPr lang="en-US" dirty="0" smtClean="0"/>
+              <a:t>PREESM Actor model guarantees memory independency between Actors and the data is moved in static size units</a:t>
+            </a:r>
           </a:p>
         </p:txBody>
       </p:sp>
     </p:spTree>
     <p:extLst>
       <p:ext uri="{BB962C8B-B14F-4D97-AF65-F5344CB8AC3E}">
-        <p14:creationId xmlns:p14="http://schemas.microsoft.com/office/powerpoint/2010/main" val="3545089472"/>
+        <p14:creationId xmlns:p14="http://schemas.microsoft.com/office/powerpoint/2010/main" val="1538209171"/>
       </p:ext>
     </p:extLst>
   </p:cSld>
@@ -5459,6 +5409,182 @@
         </p:nvSpPr>
         <p:spPr/>
         <p:txBody>
+          <a:bodyPr>
+            <a:normAutofit fontScale="90000"/>
+          </a:bodyPr>
+          <a:lstStyle/>
+          <a:p>
+            <a:r>
+              <a:rPr lang="en-US" dirty="0" smtClean="0"/>
+              <a:t>Implementing the experiment with </a:t>
+            </a:r>
+            <a:r>
+              <a:rPr lang="en-US" dirty="0" err="1" smtClean="0"/>
+              <a:t>OpenEM</a:t>
+            </a:r>
+            <a:endParaRPr lang="en-US" dirty="0"/>
+          </a:p>
+        </p:txBody>
+      </p:sp>
+      <p:sp>
+        <p:nvSpPr>
+          <p:cNvPr id="3" name="Content Placeholder 2"/>
+          <p:cNvSpPr>
+            <a:spLocks noGrp="1"/>
+          </p:cNvSpPr>
+          <p:nvPr>
+            <p:ph idx="1"/>
+          </p:nvPr>
+        </p:nvSpPr>
+        <p:spPr/>
+        <p:txBody>
+          <a:bodyPr>
+            <a:normAutofit fontScale="85000" lnSpcReduction="20000"/>
+          </a:bodyPr>
+          <a:lstStyle/>
+          <a:p>
+            <a:r>
+              <a:rPr lang="en-US" dirty="0" smtClean="0"/>
+              <a:t>Input</a:t>
+            </a:r>
+          </a:p>
+          <a:p>
+            <a:pPr lvl="1"/>
+            <a:r>
+              <a:rPr lang="en-US" dirty="0" smtClean="0"/>
+              <a:t>Data preloaded in to memory</a:t>
+            </a:r>
+          </a:p>
+          <a:p>
+            <a:pPr lvl="1"/>
+            <a:r>
+              <a:rPr lang="en-US" dirty="0" smtClean="0"/>
+              <a:t>A regular for loop </a:t>
+            </a:r>
+            <a:r>
+              <a:rPr lang="en-US" dirty="0" err="1" smtClean="0"/>
+              <a:t>em_allocing</a:t>
+            </a:r>
+            <a:r>
+              <a:rPr lang="en-US" dirty="0" smtClean="0"/>
+              <a:t> events outside the </a:t>
+            </a:r>
+            <a:r>
+              <a:rPr lang="en-US" dirty="0" err="1" smtClean="0"/>
+              <a:t>OpenEM</a:t>
+            </a:r>
+            <a:r>
+              <a:rPr lang="en-US" dirty="0" smtClean="0"/>
+              <a:t> operating context</a:t>
+            </a:r>
+          </a:p>
+          <a:p>
+            <a:pPr lvl="1"/>
+            <a:r>
+              <a:rPr lang="en-US" dirty="0" smtClean="0"/>
+              <a:t>Low priority Queue for input events that </a:t>
+            </a:r>
+            <a:r>
+              <a:rPr lang="en-US" dirty="0" err="1" smtClean="0"/>
+              <a:t>em_alloc</a:t>
+            </a:r>
+            <a:r>
+              <a:rPr lang="en-US" dirty="0" smtClean="0"/>
+              <a:t> actual data events and new input events</a:t>
+            </a:r>
+          </a:p>
+          <a:p>
+            <a:r>
+              <a:rPr lang="en-US" dirty="0" smtClean="0"/>
+              <a:t>Output</a:t>
+            </a:r>
+          </a:p>
+          <a:p>
+            <a:pPr lvl="1"/>
+            <a:r>
+              <a:rPr lang="en-US" dirty="0" smtClean="0"/>
+              <a:t>Low priority queues which collect events holding the results that are allocated by the actual filter EO</a:t>
+            </a:r>
+          </a:p>
+          <a:p>
+            <a:pPr lvl="1"/>
+            <a:r>
+              <a:rPr lang="en-US" dirty="0" smtClean="0"/>
+              <a:t>Collect statistics and free events</a:t>
+            </a:r>
+          </a:p>
+          <a:p>
+            <a:r>
+              <a:rPr lang="en-US" dirty="0" smtClean="0"/>
+              <a:t>Processing</a:t>
+            </a:r>
+          </a:p>
+          <a:p>
+            <a:pPr lvl="1"/>
+            <a:r>
+              <a:rPr lang="en-US" dirty="0" smtClean="0"/>
+              <a:t>Filters implemented as Execution objects</a:t>
+            </a:r>
+          </a:p>
+          <a:p>
+            <a:pPr lvl="1"/>
+            <a:endParaRPr lang="en-US" dirty="0" smtClean="0"/>
+          </a:p>
+          <a:p>
+            <a:pPr lvl="1"/>
+            <a:endParaRPr lang="en-US" dirty="0" smtClean="0"/>
+          </a:p>
+        </p:txBody>
+      </p:sp>
+    </p:spTree>
+    <p:extLst>
+      <p:ext uri="{BB962C8B-B14F-4D97-AF65-F5344CB8AC3E}">
+        <p14:creationId xmlns:p14="http://schemas.microsoft.com/office/powerpoint/2010/main" val="3545089472"/>
+      </p:ext>
+    </p:extLst>
+  </p:cSld>
+  <p:clrMapOvr>
+    <a:masterClrMapping/>
+  </p:clrMapOvr>
+  <p:timing>
+    <p:tnLst>
+      <p:par>
+        <p:cTn xmlns:p14="http://schemas.microsoft.com/office/powerpoint/2010/main" id="1" dur="indefinite" restart="never" nodeType="tmRoot"/>
+      </p:par>
+    </p:tnLst>
+  </p:timing>
+</p:sld>
+</file>
+
+<file path=ppt/slides/slide21.xml><?xml version="1.0" encoding="utf-8"?>
+<p:sld xmlns:a="http://schemas.openxmlformats.org/drawingml/2006/main" xmlns:r="http://schemas.openxmlformats.org/officeDocument/2006/relationships" xmlns:p="http://schemas.openxmlformats.org/presentationml/2006/main">
+  <p:cSld>
+    <p:spTree>
+      <p:nvGrpSpPr>
+        <p:cNvPr id="1" name=""/>
+        <p:cNvGrpSpPr/>
+        <p:nvPr/>
+      </p:nvGrpSpPr>
+      <p:grpSpPr>
+        <a:xfrm>
+          <a:off x="0" y="0"/>
+          <a:ext cx="0" cy="0"/>
+          <a:chOff x="0" y="0"/>
+          <a:chExt cx="0" cy="0"/>
+        </a:xfrm>
+      </p:grpSpPr>
+      <p:sp>
+        <p:nvSpPr>
+          <p:cNvPr id="2" name="Title 1"/>
+          <p:cNvSpPr>
+            <a:spLocks noGrp="1"/>
+          </p:cNvSpPr>
+          <p:nvPr>
+            <p:ph type="title"/>
+          </p:nvPr>
+        </p:nvSpPr>
+        <p:spPr/>
+        <p:txBody>
           <a:bodyPr/>
           <a:lstStyle/>
           <a:p>
@@ -5564,7 +5690,7 @@
 </p:sld>
 </file>
 
-<file path=ppt/slides/slide21.xml><?xml version="1.0" encoding="utf-8"?>
+<file path=ppt/slides/slide22.xml><?xml version="1.0" encoding="utf-8"?>
 <p:sld xmlns:a="http://schemas.openxmlformats.org/drawingml/2006/main" xmlns:r="http://schemas.openxmlformats.org/officeDocument/2006/relationships" xmlns:p="http://schemas.openxmlformats.org/presentationml/2006/main">
   <p:cSld>
     <p:spTree>

</xml_diff>